<commit_message>
Updated notes on the last slide.
</commit_message>
<xml_diff>
--- a/IDon'tCode.pptx
+++ b/IDon'tCode.pptx
@@ -521,7 +521,6 @@
               <a:rPr lang="en-US" baseline="0" dirty="0" smtClean="0"/>
               <a:t> their place and identity. </a:t>
             </a:r>
-            <a:endParaRPr lang="en-US" baseline="0" dirty="0" smtClean="0"/>
           </a:p>
           <a:p>
             <a:endParaRPr lang="en-US" baseline="0" dirty="0" smtClean="0"/>
@@ -2437,10 +2436,6 @@
               <a:rPr lang="en-US" baseline="0" dirty="0" smtClean="0"/>
               <a:t> sure who is the original author though. </a:t>
             </a:r>
-            <a:r>
-              <a:rPr lang="en-US" baseline="0" smtClean="0"/>
-              <a:t/>
-            </a:r>
             <a:endParaRPr lang="en-US" dirty="0"/>
           </a:p>
         </p:txBody>
@@ -2809,6 +2804,102 @@
         </p:txBody>
       </p:sp>
     </p:spTree>
+  </p:cSld>
+  <p:clrMapOvr>
+    <a:masterClrMapping/>
+  </p:clrMapOvr>
+</p:notes>
+</file>
+
+<file path=ppt/notesSlides/notesSlide8.xml><?xml version="1.0" encoding="utf-8"?>
+<p:notes xmlns:a="http://schemas.openxmlformats.org/drawingml/2006/main" xmlns:r="http://schemas.openxmlformats.org/officeDocument/2006/relationships" xmlns:p="http://schemas.openxmlformats.org/presentationml/2006/main">
+  <p:cSld>
+    <p:spTree>
+      <p:nvGrpSpPr>
+        <p:cNvPr id="1" name=""/>
+        <p:cNvGrpSpPr/>
+        <p:nvPr/>
+      </p:nvGrpSpPr>
+      <p:grpSpPr>
+        <a:xfrm>
+          <a:off x="0" y="0"/>
+          <a:ext cx="0" cy="0"/>
+          <a:chOff x="0" y="0"/>
+          <a:chExt cx="0" cy="0"/>
+        </a:xfrm>
+      </p:grpSpPr>
+      <p:sp>
+        <p:nvSpPr>
+          <p:cNvPr id="2" name="Slide Image Placeholder 1"/>
+          <p:cNvSpPr>
+            <a:spLocks noGrp="1" noRot="1" noChangeAspect="1"/>
+          </p:cNvSpPr>
+          <p:nvPr>
+            <p:ph type="sldImg"/>
+          </p:nvPr>
+        </p:nvSpPr>
+        <p:spPr/>
+      </p:sp>
+      <p:sp>
+        <p:nvSpPr>
+          <p:cNvPr id="3" name="Notes Placeholder 2"/>
+          <p:cNvSpPr>
+            <a:spLocks noGrp="1"/>
+          </p:cNvSpPr>
+          <p:nvPr>
+            <p:ph type="body" idx="1"/>
+          </p:nvPr>
+        </p:nvSpPr>
+        <p:spPr/>
+        <p:txBody>
+          <a:bodyPr/>
+          <a:lstStyle/>
+          <a:p>
+            <a:r>
+              <a:rPr lang="en-US" dirty="0" smtClean="0"/>
+              <a:t>Can learning code be a bad thing? I would hope not. There’s “opportunity cost” – the</a:t>
+            </a:r>
+            <a:r>
+              <a:rPr lang="en-US" baseline="0" dirty="0" smtClean="0"/>
+              <a:t> idea that time used on something is time away from something else. And early focus on code may cause you to be more blind to the other perspectives. But since usually seasoned architects / truly skilled developers are no longer as vulnerable to bugs (they test themselves), you can choose to learn skills in layers in whatever order you find relevant </a:t>
+            </a:r>
+            <a:r>
+              <a:rPr lang="en-US" baseline="0" smtClean="0"/>
+              <a:t>and useful. </a:t>
+            </a:r>
+            <a:endParaRPr lang="en-US"/>
+          </a:p>
+        </p:txBody>
+      </p:sp>
+      <p:sp>
+        <p:nvSpPr>
+          <p:cNvPr id="4" name="Slide Number Placeholder 3"/>
+          <p:cNvSpPr>
+            <a:spLocks noGrp="1"/>
+          </p:cNvSpPr>
+          <p:nvPr>
+            <p:ph type="sldNum" sz="quarter" idx="10"/>
+          </p:nvPr>
+        </p:nvSpPr>
+        <p:spPr/>
+        <p:txBody>
+          <a:bodyPr/>
+          <a:lstStyle/>
+          <a:p>
+            <a:fld id="{EA250A07-4D2A-7849-9F6D-B86F2EED1D51}" type="slidenum">
+              <a:rPr lang="en-US" smtClean="0"/>
+              <a:t>10</a:t>
+            </a:fld>
+            <a:endParaRPr lang="en-US"/>
+          </a:p>
+        </p:txBody>
+      </p:sp>
+    </p:spTree>
+    <p:extLst>
+      <p:ext uri="{BB962C8B-B14F-4D97-AF65-F5344CB8AC3E}">
+        <p14:creationId xmlns:p14="http://schemas.microsoft.com/office/powerpoint/2010/main" val="1833897822"/>
+      </p:ext>
+    </p:extLst>
   </p:cSld>
   <p:clrMapOvr>
     <a:masterClrMapping/>

</xml_diff>

<commit_message>
Finnish version of the talk.
</commit_message>
<xml_diff>
--- a/IDon'tCode.pptx
+++ b/IDon'tCode.pptx
@@ -16,7 +16,7 @@
     <p:sldId id="264" r:id="rId7"/>
     <p:sldId id="261" r:id="rId8"/>
     <p:sldId id="263" r:id="rId9"/>
-    <p:sldId id="262" r:id="rId10"/>
+    <p:sldId id="267" r:id="rId10"/>
     <p:sldId id="265" r:id="rId11"/>
   </p:sldIdLst>
   <p:sldSz cx="9144000" cy="6858000" type="screen4x3"/>
@@ -2495,7 +2495,7 @@
       </p:grpSpPr>
       <p:sp>
         <p:nvSpPr>
-          <p:cNvPr id="7" name="Rectangle 7"/>
+          <p:cNvPr id="51201" name="Rectangle 7"/>
           <p:cNvSpPr>
             <a:spLocks noGrp="1" noChangeArrowheads="1"/>
           </p:cNvSpPr>
@@ -2503,16 +2503,40 @@
             <p:ph type="sldNum" sz="quarter" idx="5"/>
           </p:nvPr>
         </p:nvSpPr>
-        <p:spPr>
-          <a:ln/>
+        <p:spPr bwMode="auto">
+          <a:noFill/>
+          <a:ln>
+            <a:miter lim="800000"/>
+            <a:headEnd/>
+            <a:tailEnd/>
+          </a:ln>
         </p:spPr>
         <p:txBody>
-          <a:bodyPr/>
-          <a:lstStyle/>
-          <a:p>
-            <a:fld id="{BBED7148-4EA5-41C6-B852-A6FBBEF5B527}" type="slidenum">
+          <a:bodyPr wrap="square" numCol="1" anchorCtr="0" compatLnSpc="1">
+            <a:prstTxWarp prst="textNoShape">
+              <a:avLst/>
+            </a:prstTxWarp>
+          </a:bodyPr>
+          <a:lstStyle/>
+          <a:p>
+            <a:pPr fontAlgn="base">
+              <a:spcBef>
+                <a:spcPct val="0"/>
+              </a:spcBef>
+              <a:spcAft>
+                <a:spcPct val="0"/>
+              </a:spcAft>
+            </a:pPr>
+            <a:fld id="{9FE77189-BB34-47CB-8E5C-A9B32E54A8C7}" type="slidenum">
               <a:rPr lang="en-GB"/>
-              <a:pPr/>
+              <a:pPr fontAlgn="base">
+                <a:spcBef>
+                  <a:spcPct val="0"/>
+                </a:spcBef>
+                <a:spcAft>
+                  <a:spcPct val="0"/>
+                </a:spcAft>
+              </a:pPr>
               <a:t>9</a:t>
             </a:fld>
             <a:endParaRPr lang="en-GB"/>
@@ -2521,7 +2545,7 @@
       </p:sp>
       <p:sp>
         <p:nvSpPr>
-          <p:cNvPr id="1250306" name="Rectangle 2"/>
+          <p:cNvPr id="51202" name="Rectangle 2"/>
           <p:cNvSpPr>
             <a:spLocks noGrp="1" noRot="1" noChangeAspect="1" noChangeArrowheads="1" noTextEdit="1"/>
           </p:cNvSpPr>
@@ -2529,13 +2553,21 @@
             <p:ph type="sldImg"/>
           </p:nvPr>
         </p:nvSpPr>
-        <p:spPr>
-          <a:ln/>
+        <p:spPr bwMode="auto">
+          <a:noFill/>
+          <a:ln>
+            <a:solidFill>
+              <a:srgbClr val="000000"/>
+            </a:solidFill>
+            <a:miter lim="800000"/>
+            <a:headEnd/>
+            <a:tailEnd/>
+          </a:ln>
         </p:spPr>
       </p:sp>
       <p:sp>
         <p:nvSpPr>
-          <p:cNvPr id="1250307" name="Rectangle 3"/>
+          <p:cNvPr id="51203" name="Rectangle 3"/>
           <p:cNvSpPr>
             <a:spLocks noGrp="1" noChangeArrowheads="1"/>
           </p:cNvSpPr>
@@ -2543,263 +2575,134 @@
             <p:ph type="body" idx="1"/>
           </p:nvPr>
         </p:nvSpPr>
-        <p:spPr/>
-        <p:txBody>
-          <a:bodyPr/>
-          <a:lstStyle/>
-          <a:p>
-            <a:r>
-              <a:rPr lang="fi-FI" dirty="0" err="1"/>
+        <p:spPr bwMode="auto">
+          <a:noFill/>
+        </p:spPr>
+        <p:txBody>
+          <a:bodyPr wrap="square" numCol="1" anchor="t" anchorCtr="0" compatLnSpc="1">
+            <a:prstTxWarp prst="textNoShape">
+              <a:avLst/>
+            </a:prstTxWarp>
+          </a:bodyPr>
+          <a:lstStyle/>
+          <a:p>
+            <a:pPr>
+              <a:spcBef>
+                <a:spcPct val="0"/>
+              </a:spcBef>
+            </a:pPr>
+            <a:r>
+              <a:rPr lang="fi-FI" smtClean="0"/>
               <a:t>Specialist</a:t>
             </a:r>
-            <a:endParaRPr lang="fi-FI" dirty="0"/>
-          </a:p>
-          <a:p>
-            <a:pPr lvl="1"/>
-            <a:r>
-              <a:rPr lang="fi-FI" dirty="0"/>
-              <a:t>Deep </a:t>
-            </a:r>
-            <a:r>
-              <a:rPr lang="fi-FI" dirty="0" err="1"/>
-              <a:t>understanding</a:t>
-            </a:r>
-            <a:r>
-              <a:rPr lang="fi-FI" dirty="0"/>
-              <a:t> of </a:t>
-            </a:r>
-            <a:r>
-              <a:rPr lang="fi-FI" dirty="0" err="1"/>
-              <a:t>some</a:t>
-            </a:r>
-            <a:r>
-              <a:rPr lang="fi-FI" dirty="0"/>
-              <a:t> </a:t>
-            </a:r>
-            <a:r>
-              <a:rPr lang="fi-FI" dirty="0" err="1"/>
-              <a:t>areas</a:t>
-            </a:r>
-            <a:endParaRPr lang="fi-FI" dirty="0"/>
-          </a:p>
-          <a:p>
-            <a:r>
-              <a:rPr lang="fi-FI" sz="1000" dirty="0" err="1"/>
-              <a:t>Get</a:t>
-            </a:r>
-            <a:r>
-              <a:rPr lang="fi-FI" sz="1000" dirty="0"/>
-              <a:t> </a:t>
-            </a:r>
-            <a:r>
-              <a:rPr lang="fi-FI" sz="1000" dirty="0" err="1"/>
-              <a:t>up</a:t>
-            </a:r>
-            <a:r>
-              <a:rPr lang="fi-FI" sz="1000" dirty="0"/>
-              <a:t> to </a:t>
-            </a:r>
-            <a:r>
-              <a:rPr lang="fi-FI" sz="1000" dirty="0" err="1"/>
-              <a:t>speed</a:t>
-            </a:r>
-            <a:r>
-              <a:rPr lang="fi-FI" sz="1000" dirty="0"/>
-              <a:t> </a:t>
-            </a:r>
-            <a:r>
-              <a:rPr lang="fi-FI" sz="1000" dirty="0" err="1"/>
-              <a:t>quickly</a:t>
-            </a:r>
-            <a:endParaRPr lang="fi-FI" sz="1000" dirty="0"/>
-          </a:p>
-          <a:p>
-            <a:pPr lvl="1"/>
-            <a:r>
-              <a:rPr lang="fi-FI" sz="1000" dirty="0" err="1"/>
-              <a:t>Able</a:t>
-            </a:r>
-            <a:r>
-              <a:rPr lang="fi-FI" sz="1000" dirty="0"/>
-              <a:t> to </a:t>
-            </a:r>
-            <a:r>
-              <a:rPr lang="fi-FI" sz="1000" dirty="0" err="1"/>
-              <a:t>make</a:t>
-            </a:r>
-            <a:r>
-              <a:rPr lang="fi-FI" sz="1000" dirty="0"/>
-              <a:t> </a:t>
-            </a:r>
-            <a:r>
-              <a:rPr lang="fi-FI" sz="1000" dirty="0" err="1"/>
-              <a:t>judgements</a:t>
-            </a:r>
-            <a:r>
-              <a:rPr lang="fi-FI" sz="1000" dirty="0"/>
-              <a:t> </a:t>
-            </a:r>
-            <a:r>
-              <a:rPr lang="fi-FI" sz="1000" dirty="0" err="1"/>
-              <a:t>even</a:t>
-            </a:r>
-            <a:r>
-              <a:rPr lang="fi-FI" sz="1000" dirty="0"/>
-              <a:t> </a:t>
-            </a:r>
-            <a:r>
-              <a:rPr lang="fi-FI" sz="1000" dirty="0" err="1"/>
-              <a:t>though</a:t>
-            </a:r>
-            <a:r>
-              <a:rPr lang="fi-FI" sz="1000" dirty="0"/>
-              <a:t> </a:t>
-            </a:r>
-            <a:r>
-              <a:rPr lang="fi-FI" sz="1000" dirty="0" err="1"/>
-              <a:t>subject</a:t>
-            </a:r>
-            <a:r>
-              <a:rPr lang="fi-FI" sz="1000" dirty="0"/>
-              <a:t> at </a:t>
-            </a:r>
-            <a:r>
-              <a:rPr lang="fi-FI" sz="1000" dirty="0" err="1"/>
-              <a:t>hand</a:t>
-            </a:r>
-            <a:r>
-              <a:rPr lang="fi-FI" sz="1000" dirty="0"/>
-              <a:t> </a:t>
-            </a:r>
-            <a:r>
-              <a:rPr lang="fi-FI" sz="1000" dirty="0" err="1"/>
-              <a:t>not</a:t>
-            </a:r>
-            <a:r>
-              <a:rPr lang="fi-FI" sz="1000" dirty="0"/>
-              <a:t> </a:t>
-            </a:r>
-            <a:r>
-              <a:rPr lang="fi-FI" sz="1000" dirty="0" err="1"/>
-              <a:t>mastered</a:t>
-            </a:r>
-            <a:endParaRPr lang="fi-FI" sz="1000" dirty="0"/>
-          </a:p>
-          <a:p>
-            <a:r>
-              <a:rPr lang="fi-FI" sz="1000" dirty="0" err="1"/>
+          </a:p>
+          <a:p>
+            <a:pPr lvl="1">
+              <a:spcBef>
+                <a:spcPct val="0"/>
+              </a:spcBef>
+            </a:pPr>
+            <a:r>
+              <a:rPr lang="fi-FI" smtClean="0"/>
+              <a:t>Deep understanding of some areas</a:t>
+            </a:r>
+          </a:p>
+          <a:p>
+            <a:pPr>
+              <a:spcBef>
+                <a:spcPct val="0"/>
+              </a:spcBef>
+            </a:pPr>
+            <a:r>
+              <a:rPr lang="fi-FI" sz="1000" smtClean="0"/>
+              <a:t>Get up to speed quickly</a:t>
+            </a:r>
+          </a:p>
+          <a:p>
+            <a:pPr lvl="1">
+              <a:spcBef>
+                <a:spcPct val="0"/>
+              </a:spcBef>
+            </a:pPr>
+            <a:r>
+              <a:rPr lang="fi-FI" sz="1000" smtClean="0"/>
+              <a:t>Able to make judgements even though subject at hand not mastered</a:t>
+            </a:r>
+          </a:p>
+          <a:p>
+            <a:pPr>
+              <a:spcBef>
+                <a:spcPct val="0"/>
+              </a:spcBef>
+            </a:pPr>
+            <a:r>
+              <a:rPr lang="fi-FI" sz="1000" smtClean="0"/>
               <a:t>Generalist</a:t>
             </a:r>
-            <a:endParaRPr lang="fi-FI" sz="1000" dirty="0"/>
-          </a:p>
-          <a:p>
-            <a:pPr lvl="1"/>
-            <a:r>
-              <a:rPr lang="fi-FI" sz="1000" dirty="0"/>
-              <a:t>Broad </a:t>
-            </a:r>
-            <a:r>
-              <a:rPr lang="fi-FI" sz="1000" dirty="0" err="1"/>
-              <a:t>understanding</a:t>
-            </a:r>
-            <a:r>
-              <a:rPr lang="fi-FI" sz="1000" dirty="0"/>
-              <a:t> of </a:t>
-            </a:r>
-            <a:r>
-              <a:rPr lang="fi-FI" sz="1000" dirty="0" err="1"/>
-              <a:t>many</a:t>
-            </a:r>
-            <a:r>
-              <a:rPr lang="fi-FI" sz="1000" dirty="0"/>
-              <a:t> </a:t>
-            </a:r>
-            <a:r>
-              <a:rPr lang="fi-FI" sz="1000" dirty="0" err="1"/>
-              <a:t>areas</a:t>
-            </a:r>
-            <a:endParaRPr lang="fi-FI" sz="1000" dirty="0"/>
-          </a:p>
-          <a:p>
-            <a:r>
-              <a:rPr lang="fi-FI" sz="1000" dirty="0" err="1"/>
-              <a:t>Domain</a:t>
-            </a:r>
-            <a:r>
-              <a:rPr lang="fi-FI" sz="1000" dirty="0"/>
-              <a:t> </a:t>
-            </a:r>
-            <a:r>
-              <a:rPr lang="fi-FI" sz="1000" dirty="0" err="1"/>
-              <a:t>knowledge</a:t>
-            </a:r>
-            <a:endParaRPr lang="fi-FI" sz="1000" dirty="0"/>
-          </a:p>
-          <a:p>
-            <a:pPr lvl="1"/>
-            <a:r>
-              <a:rPr lang="fi-FI" sz="1000" dirty="0" err="1"/>
-              <a:t>User’s</a:t>
-            </a:r>
-            <a:r>
-              <a:rPr lang="fi-FI" sz="1000" dirty="0"/>
-              <a:t> </a:t>
-            </a:r>
-            <a:r>
-              <a:rPr lang="fi-FI" sz="1000" dirty="0" err="1"/>
-              <a:t>knowledge</a:t>
-            </a:r>
-            <a:endParaRPr lang="fi-FI" sz="1000" dirty="0"/>
-          </a:p>
-          <a:p>
-            <a:r>
-              <a:rPr lang="fi-FI" sz="1000" dirty="0" err="1"/>
-              <a:t>Ignorance</a:t>
-            </a:r>
-            <a:r>
-              <a:rPr lang="fi-FI" sz="1000" dirty="0"/>
-              <a:t> is </a:t>
-            </a:r>
-            <a:r>
-              <a:rPr lang="fi-FI" sz="1000" dirty="0" err="1"/>
-              <a:t>important</a:t>
-            </a:r>
-            <a:endParaRPr lang="fi-FI" sz="1000" dirty="0"/>
-          </a:p>
-          <a:p>
-            <a:pPr lvl="1"/>
-            <a:r>
-              <a:rPr lang="fi-FI" sz="1000" dirty="0" err="1"/>
-              <a:t>Gaining</a:t>
-            </a:r>
-            <a:r>
-              <a:rPr lang="fi-FI" sz="1000" dirty="0"/>
-              <a:t> and </a:t>
-            </a:r>
-            <a:r>
-              <a:rPr lang="fi-FI" sz="1000" dirty="0" err="1"/>
-              <a:t>combining</a:t>
-            </a:r>
-            <a:r>
-              <a:rPr lang="fi-FI" sz="1000" dirty="0"/>
-              <a:t> </a:t>
-            </a:r>
-            <a:r>
-              <a:rPr lang="fi-FI" sz="1000" dirty="0" err="1"/>
-              <a:t>superficial</a:t>
-            </a:r>
-            <a:r>
-              <a:rPr lang="fi-FI" sz="1000" dirty="0"/>
-              <a:t> </a:t>
-            </a:r>
-            <a:r>
-              <a:rPr lang="fi-FI" sz="1000" dirty="0" err="1"/>
-              <a:t>knowledge</a:t>
-            </a:r>
-            <a:endParaRPr lang="en-GB" sz="1000" dirty="0"/>
-          </a:p>
-          <a:p>
-            <a:endParaRPr lang="en-GB" dirty="0"/>
+          </a:p>
+          <a:p>
+            <a:pPr lvl="1">
+              <a:spcBef>
+                <a:spcPct val="0"/>
+              </a:spcBef>
+            </a:pPr>
+            <a:r>
+              <a:rPr lang="fi-FI" sz="1000" smtClean="0"/>
+              <a:t>Broad understanding of many areas</a:t>
+            </a:r>
+          </a:p>
+          <a:p>
+            <a:pPr>
+              <a:spcBef>
+                <a:spcPct val="0"/>
+              </a:spcBef>
+            </a:pPr>
+            <a:r>
+              <a:rPr lang="fi-FI" sz="1000" smtClean="0"/>
+              <a:t>Domain knowledge</a:t>
+            </a:r>
+          </a:p>
+          <a:p>
+            <a:pPr lvl="1">
+              <a:spcBef>
+                <a:spcPct val="0"/>
+              </a:spcBef>
+            </a:pPr>
+            <a:r>
+              <a:rPr lang="fi-FI" sz="1000" smtClean="0"/>
+              <a:t>User’s knowledge</a:t>
+            </a:r>
+          </a:p>
+          <a:p>
+            <a:pPr>
+              <a:spcBef>
+                <a:spcPct val="0"/>
+              </a:spcBef>
+            </a:pPr>
+            <a:r>
+              <a:rPr lang="fi-FI" sz="1000" smtClean="0"/>
+              <a:t>Ignorance is important</a:t>
+            </a:r>
+          </a:p>
+          <a:p>
+            <a:pPr lvl="1">
+              <a:spcBef>
+                <a:spcPct val="0"/>
+              </a:spcBef>
+            </a:pPr>
+            <a:r>
+              <a:rPr lang="fi-FI" sz="1000" smtClean="0"/>
+              <a:t>Gaining and combining superficial knowledge</a:t>
+            </a:r>
+            <a:endParaRPr lang="en-GB" sz="1000" smtClean="0"/>
+          </a:p>
+          <a:p>
+            <a:pPr>
+              <a:spcBef>
+                <a:spcPct val="0"/>
+              </a:spcBef>
+            </a:pPr>
+            <a:endParaRPr lang="en-GB" smtClean="0"/>
           </a:p>
         </p:txBody>
       </p:sp>
@@ -5911,8 +5814,44 @@
           <a:lstStyle/>
           <a:p>
             <a:r>
+              <a:rPr lang="en-US" dirty="0" err="1" smtClean="0"/>
+              <a:t>Minä</a:t>
+            </a:r>
+            <a:r>
               <a:rPr lang="en-US" dirty="0" smtClean="0"/>
-              <a:t>I Don’t Code, Am I No Longer Useful?</a:t>
+              <a:t> en </a:t>
+            </a:r>
+            <a:r>
+              <a:rPr lang="en-US" dirty="0" err="1" smtClean="0"/>
+              <a:t>koodaa</a:t>
+            </a:r>
+            <a:r>
+              <a:rPr lang="en-US" dirty="0" smtClean="0"/>
+              <a:t>, </a:t>
+            </a:r>
+            <a:r>
+              <a:rPr lang="en-US" dirty="0" err="1" smtClean="0"/>
+              <a:t>olenko</a:t>
+            </a:r>
+            <a:r>
+              <a:rPr lang="en-US" dirty="0" smtClean="0"/>
+              <a:t> </a:t>
+            </a:r>
+            <a:r>
+              <a:rPr lang="en-US" dirty="0" err="1" smtClean="0"/>
+              <a:t>enää</a:t>
+            </a:r>
+            <a:r>
+              <a:rPr lang="en-US" dirty="0" smtClean="0"/>
+              <a:t> </a:t>
+            </a:r>
+            <a:r>
+              <a:rPr lang="en-US" dirty="0" err="1" smtClean="0"/>
+              <a:t>hyödyllinen</a:t>
+            </a:r>
+            <a:r>
+              <a:rPr lang="en-US" dirty="0" smtClean="0"/>
+              <a:t>?</a:t>
             </a:r>
             <a:endParaRPr lang="en-US" dirty="0"/>
           </a:p>
@@ -6221,11 +6160,7 @@
           <a:p>
             <a:r>
               <a:rPr lang="fi-FI" dirty="0" smtClean="0"/>
-              <a:t>In </a:t>
-            </a:r>
-            <a:r>
-              <a:rPr lang="fi-FI" dirty="0" err="1" smtClean="0"/>
-              <a:t>Summary</a:t>
+              <a:t>Yhteenvetona</a:t>
             </a:r>
             <a:endParaRPr lang="en-US" dirty="0"/>
           </a:p>
@@ -6244,7 +6179,7 @@
         <p:spPr>
           <a:xfrm>
             <a:off x="457200" y="1600200"/>
-            <a:ext cx="4157842" cy="4525963"/>
+            <a:ext cx="4155186" cy="4525963"/>
           </a:xfrm>
         </p:spPr>
         <p:txBody>
@@ -6254,429 +6189,41 @@
           <a:lstStyle/>
           <a:p>
             <a:r>
-              <a:rPr lang="fi-FI" sz="2000" dirty="0" smtClean="0"/>
-              <a:t>Software </a:t>
-            </a:r>
-            <a:r>
-              <a:rPr lang="fi-FI" sz="2000" dirty="0" err="1" smtClean="0"/>
-              <a:t>Development</a:t>
-            </a:r>
-            <a:r>
-              <a:rPr lang="fi-FI" sz="2000" dirty="0" smtClean="0"/>
-              <a:t> </a:t>
-            </a:r>
-            <a:r>
-              <a:rPr lang="fi-FI" sz="2000" dirty="0" err="1" smtClean="0"/>
-              <a:t>has</a:t>
-            </a:r>
-            <a:r>
-              <a:rPr lang="fi-FI" sz="2000" dirty="0" smtClean="0"/>
-              <a:t> a </a:t>
-            </a:r>
-            <a:r>
-              <a:rPr lang="fi-FI" sz="2000" dirty="0" err="1" smtClean="0"/>
-              <a:t>lot</a:t>
-            </a:r>
-            <a:r>
-              <a:rPr lang="fi-FI" sz="2000" dirty="0" smtClean="0"/>
-              <a:t> of </a:t>
-            </a:r>
-            <a:r>
-              <a:rPr lang="fi-FI" sz="2000" dirty="0" err="1" smtClean="0"/>
-              <a:t>tasks</a:t>
-            </a:r>
-            <a:r>
-              <a:rPr lang="fi-FI" sz="2000" dirty="0" smtClean="0"/>
-              <a:t> </a:t>
-            </a:r>
-            <a:r>
-              <a:rPr lang="fi-FI" sz="2000" dirty="0" err="1" smtClean="0"/>
-              <a:t>that</a:t>
-            </a:r>
-            <a:r>
-              <a:rPr lang="fi-FI" sz="2000" dirty="0" smtClean="0"/>
-              <a:t> </a:t>
-            </a:r>
-            <a:r>
-              <a:rPr lang="fi-FI" sz="2000" dirty="0" err="1" smtClean="0"/>
-              <a:t>are</a:t>
-            </a:r>
-            <a:r>
-              <a:rPr lang="fi-FI" sz="2000" dirty="0" smtClean="0"/>
-              <a:t> </a:t>
-            </a:r>
-            <a:r>
-              <a:rPr lang="fi-FI" sz="2000" dirty="0" err="1" smtClean="0"/>
-              <a:t>not</a:t>
-            </a:r>
-            <a:r>
-              <a:rPr lang="fi-FI" sz="2000" dirty="0" smtClean="0"/>
-              <a:t> </a:t>
-            </a:r>
-            <a:r>
-              <a:rPr lang="fi-FI" sz="2000" dirty="0" err="1" smtClean="0"/>
-              <a:t>coding</a:t>
-            </a:r>
-            <a:endParaRPr lang="fi-FI" sz="2000" dirty="0" smtClean="0"/>
+              <a:rPr lang="fi-FI" sz="2400" dirty="0"/>
+              <a:t>Ohjelmistokehitykseen kuuluu paljon tehtäviä, joissa ei tarvitse koodata</a:t>
+            </a:r>
           </a:p>
           <a:p>
             <a:pPr lvl="1"/>
             <a:r>
-              <a:rPr lang="fi-FI" sz="2000" dirty="0" smtClean="0"/>
-              <a:t>… </a:t>
-            </a:r>
-            <a:r>
-              <a:rPr lang="fi-FI" sz="2000" dirty="0" err="1" smtClean="0"/>
-              <a:t>even</a:t>
-            </a:r>
-            <a:r>
-              <a:rPr lang="fi-FI" sz="2000" dirty="0" smtClean="0"/>
-              <a:t> </a:t>
-            </a:r>
-            <a:r>
-              <a:rPr lang="fi-FI" sz="2000" dirty="0" err="1" smtClean="0"/>
-              <a:t>if</a:t>
-            </a:r>
-            <a:r>
-              <a:rPr lang="fi-FI" sz="2000" dirty="0" smtClean="0"/>
-              <a:t> </a:t>
-            </a:r>
-            <a:r>
-              <a:rPr lang="fi-FI" sz="2000" dirty="0" err="1" smtClean="0"/>
-              <a:t>it</a:t>
-            </a:r>
-            <a:r>
-              <a:rPr lang="fi-FI" sz="2000" dirty="0" smtClean="0"/>
-              <a:t> </a:t>
-            </a:r>
-            <a:r>
-              <a:rPr lang="fi-FI" sz="2000" dirty="0" err="1" smtClean="0"/>
-              <a:t>was</a:t>
-            </a:r>
-            <a:r>
-              <a:rPr lang="fi-FI" sz="2000" dirty="0" smtClean="0"/>
-              <a:t> </a:t>
-            </a:r>
-            <a:r>
-              <a:rPr lang="fi-FI" sz="2000" dirty="0" err="1" smtClean="0"/>
-              <a:t>great</a:t>
-            </a:r>
-            <a:r>
-              <a:rPr lang="fi-FI" sz="2000" dirty="0" smtClean="0"/>
-              <a:t> </a:t>
-            </a:r>
-            <a:r>
-              <a:rPr lang="fi-FI" sz="2000" dirty="0" err="1" smtClean="0"/>
-              <a:t>if</a:t>
-            </a:r>
-            <a:r>
-              <a:rPr lang="fi-FI" sz="2000" dirty="0" smtClean="0"/>
-              <a:t> </a:t>
-            </a:r>
-            <a:r>
-              <a:rPr lang="fi-FI" sz="2000" dirty="0" err="1" smtClean="0"/>
-              <a:t>everyone</a:t>
-            </a:r>
-            <a:r>
-              <a:rPr lang="fi-FI" sz="2000" dirty="0" smtClean="0"/>
-              <a:t> </a:t>
-            </a:r>
-            <a:r>
-              <a:rPr lang="fi-FI" sz="2000" dirty="0" err="1" smtClean="0"/>
-              <a:t>could</a:t>
-            </a:r>
-            <a:r>
-              <a:rPr lang="fi-FI" sz="2000" dirty="0" smtClean="0"/>
-              <a:t> </a:t>
-            </a:r>
-            <a:r>
-              <a:rPr lang="fi-FI" sz="2000" dirty="0" err="1" smtClean="0"/>
-              <a:t>do</a:t>
-            </a:r>
-            <a:r>
-              <a:rPr lang="fi-FI" sz="2000" dirty="0" smtClean="0"/>
-              <a:t> </a:t>
-            </a:r>
-            <a:r>
-              <a:rPr lang="fi-FI" sz="2000" dirty="0" err="1" smtClean="0"/>
-              <a:t>everything</a:t>
-            </a:r>
-            <a:endParaRPr lang="fi-FI" sz="2000" dirty="0" smtClean="0"/>
+              <a:rPr lang="fi-FI" sz="2000" dirty="0"/>
+              <a:t>…vaikka olisikin hienoa jos kaikki osaisivat kaikkea</a:t>
+            </a:r>
           </a:p>
           <a:p>
             <a:pPr lvl="1"/>
             <a:r>
-              <a:rPr lang="fi-FI" sz="2000" dirty="0" smtClean="0"/>
-              <a:t>And </a:t>
-            </a:r>
-            <a:r>
-              <a:rPr lang="fi-FI" sz="2000" dirty="0" err="1" smtClean="0"/>
-              <a:t>it</a:t>
-            </a:r>
-            <a:r>
-              <a:rPr lang="fi-FI" sz="2000" dirty="0" smtClean="0"/>
-              <a:t> </a:t>
-            </a:r>
-            <a:r>
-              <a:rPr lang="fi-FI" sz="2000" dirty="0" err="1" smtClean="0"/>
-              <a:t>would</a:t>
-            </a:r>
-            <a:r>
-              <a:rPr lang="fi-FI" sz="2000" dirty="0" smtClean="0"/>
-              <a:t> </a:t>
-            </a:r>
-            <a:r>
-              <a:rPr lang="fi-FI" sz="2000" dirty="0" err="1" smtClean="0"/>
-              <a:t>not</a:t>
-            </a:r>
-            <a:r>
-              <a:rPr lang="fi-FI" sz="2000" dirty="0" smtClean="0"/>
-              <a:t> </a:t>
-            </a:r>
-            <a:r>
-              <a:rPr lang="fi-FI" sz="2000" dirty="0" err="1" smtClean="0"/>
-              <a:t>be</a:t>
-            </a:r>
-            <a:r>
-              <a:rPr lang="fi-FI" sz="2000" dirty="0" smtClean="0"/>
-              <a:t> </a:t>
-            </a:r>
-            <a:r>
-              <a:rPr lang="fi-FI" sz="2000" dirty="0" err="1" smtClean="0"/>
-              <a:t>great</a:t>
-            </a:r>
-            <a:r>
-              <a:rPr lang="fi-FI" sz="2000" dirty="0" smtClean="0"/>
-              <a:t> </a:t>
-            </a:r>
-            <a:r>
-              <a:rPr lang="fi-FI" sz="2000" dirty="0" err="1" smtClean="0"/>
-              <a:t>if</a:t>
-            </a:r>
-            <a:r>
-              <a:rPr lang="fi-FI" sz="2000" dirty="0" smtClean="0"/>
-              <a:t> </a:t>
-            </a:r>
-            <a:r>
-              <a:rPr lang="fi-FI" sz="2000" dirty="0" err="1" smtClean="0"/>
-              <a:t>everyone</a:t>
-            </a:r>
-            <a:r>
-              <a:rPr lang="fi-FI" sz="2000" dirty="0" smtClean="0"/>
-              <a:t> </a:t>
-            </a:r>
-            <a:r>
-              <a:rPr lang="fi-FI" sz="2000" dirty="0" err="1" smtClean="0"/>
-              <a:t>was</a:t>
-            </a:r>
-            <a:r>
-              <a:rPr lang="fi-FI" sz="2000" dirty="0" smtClean="0"/>
-              <a:t> </a:t>
-            </a:r>
-            <a:r>
-              <a:rPr lang="fi-FI" sz="2000" dirty="0" err="1" smtClean="0"/>
-              <a:t>exactly</a:t>
-            </a:r>
-            <a:r>
-              <a:rPr lang="fi-FI" sz="2000" dirty="0" smtClean="0"/>
-              <a:t> the </a:t>
-            </a:r>
-            <a:r>
-              <a:rPr lang="fi-FI" sz="2000" dirty="0" err="1" smtClean="0"/>
-              <a:t>same</a:t>
-            </a:r>
-            <a:r>
-              <a:rPr lang="fi-FI" sz="2000" dirty="0" smtClean="0"/>
-              <a:t> (</a:t>
-            </a:r>
-            <a:r>
-              <a:rPr lang="fi-FI" sz="2000" dirty="0" err="1" smtClean="0"/>
-              <a:t>diversity</a:t>
-            </a:r>
-            <a:r>
-              <a:rPr lang="fi-FI" sz="2000" dirty="0" smtClean="0"/>
-              <a:t>!)</a:t>
-            </a:r>
-          </a:p>
-          <a:p>
-            <a:r>
-              <a:rPr lang="fi-FI" sz="2000" dirty="0" err="1" smtClean="0"/>
-              <a:t>Testers</a:t>
-            </a:r>
-            <a:r>
-              <a:rPr lang="fi-FI" sz="2000" dirty="0" smtClean="0"/>
-              <a:t> </a:t>
-            </a:r>
-            <a:r>
-              <a:rPr lang="fi-FI" sz="2000" dirty="0" err="1" smtClean="0"/>
-              <a:t>need</a:t>
-            </a:r>
-            <a:r>
-              <a:rPr lang="fi-FI" sz="2000" dirty="0" smtClean="0"/>
-              <a:t> to </a:t>
-            </a:r>
-            <a:r>
-              <a:rPr lang="fi-FI" sz="2000" dirty="0" err="1" smtClean="0"/>
-              <a:t>learn</a:t>
-            </a:r>
-            <a:r>
-              <a:rPr lang="fi-FI" sz="2000" dirty="0" smtClean="0"/>
-              <a:t> to </a:t>
-            </a:r>
-            <a:r>
-              <a:rPr lang="fi-FI" sz="2000" dirty="0" err="1" smtClean="0"/>
-              <a:t>explain</a:t>
-            </a:r>
-            <a:r>
-              <a:rPr lang="fi-FI" sz="2000" dirty="0" smtClean="0"/>
-              <a:t> the </a:t>
-            </a:r>
-            <a:r>
-              <a:rPr lang="fi-FI" sz="2000" dirty="0" err="1" smtClean="0"/>
-              <a:t>value</a:t>
-            </a:r>
-            <a:r>
-              <a:rPr lang="fi-FI" sz="2000" dirty="0" smtClean="0"/>
-              <a:t> </a:t>
-            </a:r>
-            <a:r>
-              <a:rPr lang="fi-FI" sz="2000" dirty="0" err="1" smtClean="0"/>
-              <a:t>they</a:t>
-            </a:r>
-            <a:r>
-              <a:rPr lang="fi-FI" sz="2000" dirty="0" smtClean="0"/>
-              <a:t> </a:t>
-            </a:r>
-            <a:r>
-              <a:rPr lang="fi-FI" sz="2000" dirty="0" err="1" smtClean="0"/>
-              <a:t>provide</a:t>
-            </a:r>
-            <a:r>
-              <a:rPr lang="fi-FI" sz="2000" dirty="0" smtClean="0"/>
-              <a:t> – </a:t>
-            </a:r>
-            <a:r>
-              <a:rPr lang="fi-FI" sz="2000" dirty="0" err="1" smtClean="0"/>
-              <a:t>sales</a:t>
-            </a:r>
-            <a:r>
-              <a:rPr lang="fi-FI" sz="2000" dirty="0" smtClean="0"/>
-              <a:t> </a:t>
-            </a:r>
-            <a:r>
-              <a:rPr lang="fi-FI" sz="2000" dirty="0" err="1" smtClean="0"/>
-              <a:t>skills</a:t>
-            </a:r>
-            <a:endParaRPr lang="fi-FI" sz="2000" dirty="0" smtClean="0"/>
-          </a:p>
-          <a:p>
-            <a:r>
-              <a:rPr lang="fi-FI" sz="2000" dirty="0" err="1" smtClean="0"/>
-              <a:t>Flexibility</a:t>
-            </a:r>
-            <a:r>
-              <a:rPr lang="fi-FI" sz="2000" dirty="0" smtClean="0"/>
-              <a:t> in </a:t>
-            </a:r>
-            <a:r>
-              <a:rPr lang="fi-FI" sz="2000" dirty="0" err="1" smtClean="0"/>
-              <a:t>titles</a:t>
-            </a:r>
-            <a:r>
-              <a:rPr lang="fi-FI" sz="2000" dirty="0" smtClean="0"/>
-              <a:t>, a </a:t>
-            </a:r>
-            <a:r>
-              <a:rPr lang="fi-FI" sz="2000" dirty="0" err="1" smtClean="0"/>
-              <a:t>future</a:t>
-            </a:r>
-            <a:r>
-              <a:rPr lang="fi-FI" sz="2000" dirty="0" smtClean="0"/>
-              <a:t> as a </a:t>
-            </a:r>
-            <a:r>
-              <a:rPr lang="fi-FI" sz="2000" dirty="0" err="1" smtClean="0"/>
-              <a:t>product</a:t>
-            </a:r>
-            <a:r>
-              <a:rPr lang="fi-FI" sz="2000" dirty="0" smtClean="0"/>
-              <a:t> </a:t>
-            </a:r>
-            <a:r>
-              <a:rPr lang="fi-FI" sz="2000" dirty="0" err="1" smtClean="0"/>
-              <a:t>owner</a:t>
-            </a:r>
-            <a:endParaRPr lang="fi-FI" sz="2000" dirty="0" smtClean="0"/>
-          </a:p>
-          <a:p>
-            <a:pPr lvl="1"/>
-            <a:r>
-              <a:rPr lang="fi-FI" sz="2000" dirty="0" err="1" smtClean="0"/>
-              <a:t>There</a:t>
-            </a:r>
-            <a:r>
-              <a:rPr lang="fi-FI" sz="2000" dirty="0" smtClean="0"/>
-              <a:t> </a:t>
-            </a:r>
-            <a:r>
-              <a:rPr lang="fi-FI" sz="2000" dirty="0" err="1" smtClean="0"/>
-              <a:t>may</a:t>
-            </a:r>
-            <a:r>
-              <a:rPr lang="fi-FI" sz="2000" dirty="0" smtClean="0"/>
-              <a:t> </a:t>
-            </a:r>
-            <a:r>
-              <a:rPr lang="fi-FI" sz="2000" dirty="0" err="1" smtClean="0"/>
-              <a:t>be</a:t>
-            </a:r>
-            <a:r>
-              <a:rPr lang="fi-FI" sz="2000" dirty="0" smtClean="0"/>
-              <a:t> </a:t>
-            </a:r>
-            <a:r>
-              <a:rPr lang="fi-FI" sz="2000" dirty="0" err="1" smtClean="0"/>
-              <a:t>testing</a:t>
-            </a:r>
-            <a:r>
-              <a:rPr lang="fi-FI" sz="2000" dirty="0" smtClean="0"/>
-              <a:t> </a:t>
-            </a:r>
-            <a:r>
-              <a:rPr lang="fi-FI" sz="2000" dirty="0" err="1" smtClean="0"/>
-              <a:t>but</a:t>
-            </a:r>
-            <a:r>
-              <a:rPr lang="fi-FI" sz="2000" dirty="0" smtClean="0"/>
-              <a:t> </a:t>
-            </a:r>
-            <a:r>
-              <a:rPr lang="fi-FI" sz="2000" dirty="0" err="1" smtClean="0"/>
-              <a:t>not</a:t>
-            </a:r>
-            <a:r>
-              <a:rPr lang="fi-FI" sz="2000" dirty="0" smtClean="0"/>
-              <a:t> </a:t>
-            </a:r>
-            <a:r>
-              <a:rPr lang="fi-FI" sz="2000" dirty="0" err="1" smtClean="0"/>
-              <a:t>tester</a:t>
-            </a:r>
-            <a:r>
-              <a:rPr lang="fi-FI" sz="2000" dirty="0" smtClean="0"/>
-              <a:t> </a:t>
-            </a:r>
-            <a:r>
-              <a:rPr lang="fi-FI" sz="2000" dirty="0" err="1" smtClean="0"/>
-              <a:t>positions</a:t>
-            </a:r>
-            <a:endParaRPr lang="fi-FI" sz="2000" dirty="0" smtClean="0"/>
+              <a:rPr lang="fi-FI" sz="2000" dirty="0"/>
+              <a:t>Eikä olisi hienoa jos olisimme kaikki samanlaisia! </a:t>
+            </a:r>
+          </a:p>
+          <a:p>
+            <a:r>
+              <a:rPr lang="fi-FI" sz="2400" dirty="0"/>
+              <a:t>Testaajien on tärkeää opetella kuvaamaan tuottamaansa lisäarvoa – myyntitaidot</a:t>
+            </a:r>
+          </a:p>
+          <a:p>
+            <a:r>
+              <a:rPr lang="fi-FI" sz="2400" dirty="0"/>
+              <a:t>Joustavuus titteleissä, tulevaisuus tuoteomistajana</a:t>
+            </a:r>
           </a:p>
           <a:p>
             <a:pPr>
               <a:buNone/>
             </a:pPr>
-            <a:endParaRPr lang="en-US" sz="2000" dirty="0"/>
+            <a:endParaRPr lang="en-US" sz="1600" dirty="0"/>
           </a:p>
         </p:txBody>
       </p:sp>
@@ -6688,8 +6235,8 @@
         </p:nvSpPr>
         <p:spPr>
           <a:xfrm>
-            <a:off x="4837806" y="1487039"/>
-            <a:ext cx="4126682" cy="4524316"/>
+            <a:off x="4837806" y="1709879"/>
+            <a:ext cx="4126682" cy="4247317"/>
           </a:xfrm>
           <a:prstGeom prst="rect">
             <a:avLst/>
@@ -6724,8 +6271,13 @@
                   <a:schemeClr val="accent1"/>
                 </a:solidFill>
               </a:rPr>
-              <a:t>NON-PROGRAMMING WORK</a:t>
-            </a:r>
+              <a:t>TYÖTÄ, JOKA EI OHJELMOINTIA</a:t>
+            </a:r>
+            <a:endParaRPr lang="fi-FI" b="1" dirty="0" smtClean="0">
+              <a:solidFill>
+                <a:schemeClr val="accent1"/>
+              </a:solidFill>
+            </a:endParaRPr>
           </a:p>
           <a:p>
             <a:pPr algn="ctr">
@@ -6737,7 +6289,7 @@
                   <a:schemeClr val="accent1"/>
                 </a:solidFill>
               </a:rPr>
-              <a:t>WORK WITH PRODUCT MANAGEMENT</a:t>
+              <a:t>TYÖSKENTELY TUOTEHALLINNAN KANSSA</a:t>
             </a:r>
             <a:endParaRPr lang="en-US" dirty="0" smtClean="0">
               <a:solidFill>
@@ -6756,22 +6308,200 @@
                   <a:schemeClr val="accent1"/>
                 </a:solidFill>
               </a:rPr>
-              <a:t> selecting &amp; clarifying what goes into the development pipeline</a:t>
-            </a:r>
-          </a:p>
-          <a:p>
-            <a:pPr algn="ctr">
-              <a:buFont typeface="Arial" pitchFamily="34" charset="0"/>
-              <a:buChar char="•"/>
-            </a:pPr>
+              <a:t/>
+            </a:r>
+            <a:r>
+              <a:rPr lang="en-US" dirty="0" err="1" smtClean="0">
+                <a:solidFill>
+                  <a:schemeClr val="accent1"/>
+                </a:solidFill>
+              </a:rPr>
+              <a:t>Kehitykseen</a:t>
+            </a:r>
             <a:r>
               <a:rPr lang="en-US" dirty="0" smtClean="0">
                 <a:solidFill>
                   <a:schemeClr val="accent1"/>
                 </a:solidFill>
               </a:rPr>
-              <a:t> learning the system on what creates impacts to focus team work</a:t>
-            </a:r>
+              <a:t> </a:t>
+            </a:r>
+            <a:r>
+              <a:rPr lang="en-US" dirty="0" err="1" smtClean="0">
+                <a:solidFill>
+                  <a:schemeClr val="accent1"/>
+                </a:solidFill>
+              </a:rPr>
+              <a:t>menevän</a:t>
+            </a:r>
+            <a:r>
+              <a:rPr lang="en-US" dirty="0" smtClean="0">
+                <a:solidFill>
+                  <a:schemeClr val="accent1"/>
+                </a:solidFill>
+              </a:rPr>
+              <a:t> </a:t>
+            </a:r>
+            <a:r>
+              <a:rPr lang="en-US" dirty="0" err="1" smtClean="0">
+                <a:solidFill>
+                  <a:schemeClr val="accent1"/>
+                </a:solidFill>
+              </a:rPr>
+              <a:t>valinta</a:t>
+            </a:r>
+            <a:r>
+              <a:rPr lang="en-US" dirty="0" smtClean="0">
+                <a:solidFill>
+                  <a:schemeClr val="accent1"/>
+                </a:solidFill>
+              </a:rPr>
+              <a:t> </a:t>
+            </a:r>
+            <a:r>
+              <a:rPr lang="en-US" dirty="0" err="1" smtClean="0">
+                <a:solidFill>
+                  <a:schemeClr val="accent1"/>
+                </a:solidFill>
+              </a:rPr>
+              <a:t>ja</a:t>
+            </a:r>
+            <a:r>
+              <a:rPr lang="en-US" dirty="0" smtClean="0">
+                <a:solidFill>
+                  <a:schemeClr val="accent1"/>
+                </a:solidFill>
+              </a:rPr>
+              <a:t> </a:t>
+            </a:r>
+            <a:r>
+              <a:rPr lang="en-US" dirty="0" err="1" smtClean="0">
+                <a:solidFill>
+                  <a:schemeClr val="accent1"/>
+                </a:solidFill>
+              </a:rPr>
+              <a:t>selkeytys</a:t>
+            </a:r>
+            <a:endParaRPr lang="en-US" dirty="0" smtClean="0">
+              <a:solidFill>
+                <a:schemeClr val="accent1"/>
+              </a:solidFill>
+            </a:endParaRPr>
+          </a:p>
+          <a:p>
+            <a:pPr algn="ctr">
+              <a:buFont typeface="Arial" pitchFamily="34" charset="0"/>
+              <a:buChar char="•"/>
+            </a:pPr>
+            <a:r>
+              <a:rPr lang="en-US" dirty="0" err="1" smtClean="0">
+                <a:solidFill>
+                  <a:schemeClr val="accent1"/>
+                </a:solidFill>
+              </a:rPr>
+              <a:t>Järjestelmän</a:t>
+            </a:r>
+            <a:r>
+              <a:rPr lang="en-US" dirty="0" smtClean="0">
+                <a:solidFill>
+                  <a:schemeClr val="accent1"/>
+                </a:solidFill>
+              </a:rPr>
+              <a:t> </a:t>
+            </a:r>
+            <a:r>
+              <a:rPr lang="en-US" dirty="0" err="1" smtClean="0">
+                <a:solidFill>
+                  <a:schemeClr val="accent1"/>
+                </a:solidFill>
+              </a:rPr>
+              <a:t>arvosta</a:t>
+            </a:r>
+            <a:r>
+              <a:rPr lang="en-US" dirty="0" smtClean="0">
+                <a:solidFill>
+                  <a:schemeClr val="accent1"/>
+                </a:solidFill>
+              </a:rPr>
+              <a:t> </a:t>
+            </a:r>
+            <a:r>
+              <a:rPr lang="en-US" dirty="0" err="1" smtClean="0">
+                <a:solidFill>
+                  <a:schemeClr val="accent1"/>
+                </a:solidFill>
+              </a:rPr>
+              <a:t>ja</a:t>
+            </a:r>
+            <a:r>
+              <a:rPr lang="en-US" dirty="0" smtClean="0">
+                <a:solidFill>
+                  <a:schemeClr val="accent1"/>
+                </a:solidFill>
+              </a:rPr>
+              <a:t> </a:t>
+            </a:r>
+            <a:r>
+              <a:rPr lang="en-US" dirty="0" err="1" smtClean="0">
+                <a:solidFill>
+                  <a:schemeClr val="accent1"/>
+                </a:solidFill>
+              </a:rPr>
+              <a:t>merkityksestä</a:t>
+            </a:r>
+            <a:r>
+              <a:rPr lang="en-US" dirty="0" smtClean="0">
+                <a:solidFill>
+                  <a:schemeClr val="accent1"/>
+                </a:solidFill>
+              </a:rPr>
+              <a:t> </a:t>
+            </a:r>
+            <a:r>
+              <a:rPr lang="en-US" dirty="0" err="1" smtClean="0">
+                <a:solidFill>
+                  <a:schemeClr val="accent1"/>
+                </a:solidFill>
+              </a:rPr>
+              <a:t>oppiminen</a:t>
+            </a:r>
+            <a:r>
+              <a:rPr lang="en-US" dirty="0" smtClean="0">
+                <a:solidFill>
+                  <a:schemeClr val="accent1"/>
+                </a:solidFill>
+              </a:rPr>
+              <a:t> </a:t>
+            </a:r>
+            <a:r>
+              <a:rPr lang="en-US" dirty="0" err="1" smtClean="0">
+                <a:solidFill>
+                  <a:schemeClr val="accent1"/>
+                </a:solidFill>
+              </a:rPr>
+              <a:t>tiimityön</a:t>
+            </a:r>
+            <a:r>
+              <a:rPr lang="en-US" dirty="0" smtClean="0">
+                <a:solidFill>
+                  <a:schemeClr val="accent1"/>
+                </a:solidFill>
+              </a:rPr>
+              <a:t> </a:t>
+            </a:r>
+            <a:r>
+              <a:rPr lang="en-US" dirty="0" err="1" smtClean="0">
+                <a:solidFill>
+                  <a:schemeClr val="accent1"/>
+                </a:solidFill>
+              </a:rPr>
+              <a:t>tehostamiseen</a:t>
+            </a:r>
+            <a:endParaRPr lang="en-US" dirty="0" smtClean="0">
+              <a:solidFill>
+                <a:schemeClr val="accent1"/>
+              </a:solidFill>
+            </a:endParaRPr>
           </a:p>
           <a:p>
             <a:pPr algn="ctr">
@@ -6783,7 +6513,7 @@
                   <a:schemeClr val="accent1"/>
                 </a:solidFill>
               </a:rPr>
-              <a:t>WORK WITH TESTING</a:t>
+              <a:t>TYÖSKENTELY TESTAUKSESSA</a:t>
             </a:r>
             <a:endParaRPr lang="en-US" dirty="0" smtClean="0">
               <a:solidFill>
@@ -6802,34 +6532,263 @@
                   <a:schemeClr val="accent1"/>
                 </a:solidFill>
               </a:rPr>
-              <a:t> confirming and collecting ideas about what to confirm</a:t>
-            </a:r>
-          </a:p>
-          <a:p>
-            <a:pPr algn="ctr">
-              <a:buFont typeface="Arial" pitchFamily="34" charset="0"/>
-              <a:buChar char="•"/>
-            </a:pPr>
+              <a:t> </a:t>
+            </a:r>
+            <a:r>
+              <a:rPr lang="en-US" dirty="0" err="1" smtClean="0">
+                <a:solidFill>
+                  <a:schemeClr val="accent1"/>
+                </a:solidFill>
+              </a:rPr>
+              <a:t>Väitteiden</a:t>
+            </a:r>
             <a:r>
               <a:rPr lang="en-US" dirty="0" smtClean="0">
                 <a:solidFill>
                   <a:schemeClr val="accent1"/>
                 </a:solidFill>
               </a:rPr>
-              <a:t> delivering and organizing for product feedback</a:t>
-            </a:r>
+              <a:t> </a:t>
+            </a:r>
+            <a:r>
+              <a:rPr lang="en-US" dirty="0" err="1" smtClean="0">
+                <a:solidFill>
+                  <a:schemeClr val="accent1"/>
+                </a:solidFill>
+              </a:rPr>
+              <a:t>vahvistaminen</a:t>
+            </a:r>
+            <a:r>
+              <a:rPr lang="en-US" dirty="0" smtClean="0">
+                <a:solidFill>
+                  <a:schemeClr val="accent1"/>
+                </a:solidFill>
+              </a:rPr>
+              <a:t> </a:t>
+            </a:r>
+            <a:r>
+              <a:rPr lang="en-US" dirty="0" err="1" smtClean="0">
+                <a:solidFill>
+                  <a:schemeClr val="accent1"/>
+                </a:solidFill>
+              </a:rPr>
+              <a:t>ja</a:t>
+            </a:r>
+            <a:r>
+              <a:rPr lang="en-US" dirty="0" smtClean="0">
+                <a:solidFill>
+                  <a:schemeClr val="accent1"/>
+                </a:solidFill>
+              </a:rPr>
+              <a:t> </a:t>
+            </a:r>
+            <a:r>
+              <a:rPr lang="en-US" dirty="0" err="1" smtClean="0">
+                <a:solidFill>
+                  <a:schemeClr val="accent1"/>
+                </a:solidFill>
+              </a:rPr>
+              <a:t>vahvistamista</a:t>
+            </a:r>
+            <a:r>
+              <a:rPr lang="en-US" dirty="0" smtClean="0">
+                <a:solidFill>
+                  <a:schemeClr val="accent1"/>
+                </a:solidFill>
+              </a:rPr>
+              <a:t> </a:t>
+            </a:r>
+            <a:r>
+              <a:rPr lang="en-US" dirty="0" err="1" smtClean="0">
+                <a:solidFill>
+                  <a:schemeClr val="accent1"/>
+                </a:solidFill>
+              </a:rPr>
+              <a:t>vaille</a:t>
+            </a:r>
+            <a:r>
+              <a:rPr lang="en-US" dirty="0" smtClean="0">
+                <a:solidFill>
+                  <a:schemeClr val="accent1"/>
+                </a:solidFill>
+              </a:rPr>
+              <a:t> </a:t>
+            </a:r>
+            <a:r>
+              <a:rPr lang="en-US" dirty="0" err="1" smtClean="0">
+                <a:solidFill>
+                  <a:schemeClr val="accent1"/>
+                </a:solidFill>
+              </a:rPr>
+              <a:t>olevien</a:t>
+            </a:r>
+            <a:r>
+              <a:rPr lang="en-US" dirty="0" smtClean="0">
+                <a:solidFill>
+                  <a:schemeClr val="accent1"/>
+                </a:solidFill>
+              </a:rPr>
+              <a:t> </a:t>
+            </a:r>
+            <a:r>
+              <a:rPr lang="en-US" dirty="0" err="1" smtClean="0">
+                <a:solidFill>
+                  <a:schemeClr val="accent1"/>
+                </a:solidFill>
+              </a:rPr>
+              <a:t>väitteiden</a:t>
+            </a:r>
+            <a:r>
+              <a:rPr lang="en-US" dirty="0" smtClean="0">
+                <a:solidFill>
+                  <a:schemeClr val="accent1"/>
+                </a:solidFill>
+              </a:rPr>
+              <a:t> </a:t>
+            </a:r>
+            <a:r>
+              <a:rPr lang="en-US" dirty="0" err="1" smtClean="0">
+                <a:solidFill>
+                  <a:schemeClr val="accent1"/>
+                </a:solidFill>
+              </a:rPr>
+              <a:t>keräily</a:t>
+            </a:r>
+            <a:r>
+              <a:rPr lang="en-US" dirty="0" smtClean="0">
+                <a:solidFill>
+                  <a:schemeClr val="accent1"/>
+                </a:solidFill>
+              </a:rPr>
+              <a:t> </a:t>
+            </a:r>
+          </a:p>
+          <a:p>
+            <a:pPr algn="ctr">
+              <a:buFont typeface="Arial" pitchFamily="34" charset="0"/>
+              <a:buChar char="•"/>
+            </a:pPr>
+            <a:r>
+              <a:rPr lang="en-US" dirty="0" err="1" smtClean="0">
+                <a:solidFill>
+                  <a:schemeClr val="accent1"/>
+                </a:solidFill>
+              </a:rPr>
+              <a:t>Tuotep</a:t>
+            </a:r>
+            <a:r>
+              <a:rPr lang="en-US" dirty="0" err="1" smtClean="0">
+                <a:solidFill>
+                  <a:schemeClr val="accent1"/>
+                </a:solidFill>
+              </a:rPr>
+              <a:t>alautteen</a:t>
+            </a:r>
+            <a:r>
+              <a:rPr lang="en-US" dirty="0" smtClean="0">
+                <a:solidFill>
+                  <a:schemeClr val="accent1"/>
+                </a:solidFill>
+              </a:rPr>
+              <a:t> </a:t>
+            </a:r>
+            <a:r>
+              <a:rPr lang="en-US" dirty="0" err="1" smtClean="0">
+                <a:solidFill>
+                  <a:schemeClr val="accent1"/>
+                </a:solidFill>
+              </a:rPr>
+              <a:t>toimittaminen</a:t>
+            </a:r>
+            <a:r>
+              <a:rPr lang="en-US" dirty="0" smtClean="0">
+                <a:solidFill>
+                  <a:schemeClr val="accent1"/>
+                </a:solidFill>
+              </a:rPr>
+              <a:t> </a:t>
+            </a:r>
+            <a:r>
+              <a:rPr lang="en-US" dirty="0" err="1" smtClean="0">
+                <a:solidFill>
+                  <a:schemeClr val="accent1"/>
+                </a:solidFill>
+              </a:rPr>
+              <a:t>ja</a:t>
+            </a:r>
+            <a:r>
+              <a:rPr lang="en-US" dirty="0" smtClean="0">
+                <a:solidFill>
+                  <a:schemeClr val="accent1"/>
+                </a:solidFill>
+              </a:rPr>
+              <a:t> </a:t>
+            </a:r>
+            <a:r>
+              <a:rPr lang="en-US" dirty="0" err="1" smtClean="0">
+                <a:solidFill>
+                  <a:schemeClr val="accent1"/>
+                </a:solidFill>
+              </a:rPr>
+              <a:t>palautteen</a:t>
+            </a:r>
+            <a:r>
+              <a:rPr lang="en-US" dirty="0" smtClean="0">
+                <a:solidFill>
+                  <a:schemeClr val="accent1"/>
+                </a:solidFill>
+              </a:rPr>
+              <a:t> </a:t>
+            </a:r>
+            <a:r>
+              <a:rPr lang="en-US" dirty="0" err="1" smtClean="0">
+                <a:solidFill>
+                  <a:schemeClr val="accent1"/>
+                </a:solidFill>
+              </a:rPr>
+              <a:t>keruun</a:t>
+            </a:r>
+            <a:r>
+              <a:rPr lang="en-US" dirty="0" smtClean="0">
+                <a:solidFill>
+                  <a:schemeClr val="accent1"/>
+                </a:solidFill>
+              </a:rPr>
+              <a:t> </a:t>
+            </a:r>
+            <a:r>
+              <a:rPr lang="en-US" dirty="0" err="1" smtClean="0">
+                <a:solidFill>
+                  <a:schemeClr val="accent1"/>
+                </a:solidFill>
+              </a:rPr>
+              <a:t>organisointi</a:t>
+            </a:r>
+            <a:endParaRPr lang="en-US" dirty="0" smtClean="0">
+              <a:solidFill>
+                <a:schemeClr val="accent1"/>
+              </a:solidFill>
+            </a:endParaRPr>
           </a:p>
           <a:p>
             <a:pPr algn="ctr">
               <a:buNone/>
             </a:pPr>
+            <a:r>
+              <a:rPr lang="fi-FI" dirty="0" err="1" smtClean="0">
+                <a:solidFill>
+                  <a:schemeClr val="accent1"/>
+                </a:solidFill>
+              </a:rPr>
+              <a:t>Ei-KOODIN</a:t>
+            </a:r>
             <a:r>
               <a:rPr lang="fi-FI" dirty="0" smtClean="0">
                 <a:solidFill>
                   <a:schemeClr val="accent1"/>
                 </a:solidFill>
               </a:rPr>
-              <a:t>FIX NON-CODE</a:t>
+              <a:t> KORJAUKSET</a:t>
             </a:r>
             <a:endParaRPr lang="en-US" dirty="0" smtClean="0">
               <a:solidFill>
@@ -6848,8 +6807,37 @@
                   <a:schemeClr val="accent1"/>
                 </a:solidFill>
               </a:rPr>
-              <a:t> tweaking configurations</a:t>
-            </a:r>
+              <a:t> </a:t>
+            </a:r>
+            <a:r>
+              <a:rPr lang="en-US" dirty="0" err="1" smtClean="0">
+                <a:solidFill>
+                  <a:schemeClr val="accent1"/>
+                </a:solidFill>
+              </a:rPr>
+              <a:t>konfiguraatioiden</a:t>
+            </a:r>
+            <a:r>
+              <a:rPr lang="en-US" dirty="0" smtClean="0">
+                <a:solidFill>
+                  <a:schemeClr val="accent1"/>
+                </a:solidFill>
+              </a:rPr>
+              <a:t> </a:t>
+            </a:r>
+            <a:r>
+              <a:rPr lang="en-US" dirty="0" err="1" smtClean="0">
+                <a:solidFill>
+                  <a:schemeClr val="accent1"/>
+                </a:solidFill>
+              </a:rPr>
+              <a:t>säätäminen</a:t>
+            </a:r>
+            <a:endParaRPr lang="en-US" dirty="0" smtClean="0">
+              <a:solidFill>
+                <a:schemeClr val="accent1"/>
+              </a:solidFill>
+            </a:endParaRPr>
           </a:p>
           <a:p>
             <a:pPr algn="ctr">
@@ -6861,7 +6849,7 @@
                   <a:schemeClr val="accent1"/>
                 </a:solidFill>
               </a:rPr>
-              <a:t>HELP PEOPLE DELIVER VALUE BETTER</a:t>
+              <a:t>TUKI ARVON TUOTTAMISEEN</a:t>
             </a:r>
             <a:endParaRPr lang="en-US" dirty="0" smtClean="0">
               <a:solidFill>
@@ -6880,7 +6868,39 @@
                   <a:schemeClr val="accent1"/>
                 </a:solidFill>
               </a:rPr>
-              <a:t> designing improvement experiments</a:t>
+              <a:t> </a:t>
+            </a:r>
+            <a:r>
+              <a:rPr lang="en-US" dirty="0" err="1" smtClean="0">
+                <a:solidFill>
+                  <a:schemeClr val="accent1"/>
+                </a:solidFill>
+              </a:rPr>
+              <a:t>Parannustoimikokeilujen</a:t>
+            </a:r>
+            <a:r>
+              <a:rPr lang="en-US" dirty="0" smtClean="0">
+                <a:solidFill>
+                  <a:schemeClr val="accent1"/>
+                </a:solidFill>
+              </a:rPr>
+              <a:t> </a:t>
+            </a:r>
+            <a:r>
+              <a:rPr lang="en-US" dirty="0" err="1" smtClean="0">
+                <a:solidFill>
+                  <a:schemeClr val="accent1"/>
+                </a:solidFill>
+              </a:rPr>
+              <a:t>tunnistaminen</a:t>
+            </a:r>
+            <a:r>
+              <a:rPr lang="en-US" dirty="0" smtClean="0">
+                <a:solidFill>
+                  <a:schemeClr val="accent1"/>
+                </a:solidFill>
+              </a:rPr>
+              <a:t> </a:t>
             </a:r>
           </a:p>
         </p:txBody>
@@ -7024,14 +7044,14 @@
       </p:cxnSp>
       <p:sp>
         <p:nvSpPr>
-          <p:cNvPr id="7" name="TextBox 6"/>
+          <p:cNvPr id="8" name="Tekstikehys 7"/>
           <p:cNvSpPr txBox="1"/>
           <p:nvPr/>
         </p:nvSpPr>
         <p:spPr>
           <a:xfrm>
-            <a:off x="6582459" y="1085443"/>
-            <a:ext cx="2503540" cy="1477328"/>
+            <a:off x="1979712" y="3967896"/>
+            <a:ext cx="6343795" cy="1938992"/>
           </a:xfrm>
           <a:prstGeom prst="rect">
             <a:avLst/>
@@ -7044,274 +7064,52 @@
           </a:bodyPr>
           <a:lstStyle/>
           <a:p>
-            <a:pPr algn="ctr"/>
-            <a:r>
-              <a:rPr lang="en-US" dirty="0" smtClean="0">
-                <a:solidFill>
-                  <a:schemeClr val="accent1"/>
-                </a:solidFill>
-              </a:rPr>
-              <a:t>“Code not interesting? Prepare to lose to your kids in work” </a:t>
-            </a:r>
-          </a:p>
-          <a:p>
-            <a:pPr algn="ctr"/>
-            <a:r>
-              <a:rPr lang="en-US" dirty="0" smtClean="0">
-                <a:solidFill>
-                  <a:schemeClr val="accent1"/>
-                </a:solidFill>
-              </a:rPr>
-              <a:t>“3o working years from mid-life”</a:t>
-            </a:r>
-            <a:endParaRPr lang="en-US" dirty="0">
-              <a:solidFill>
-                <a:schemeClr val="accent1"/>
-              </a:solidFill>
-            </a:endParaRPr>
-          </a:p>
-        </p:txBody>
-      </p:sp>
-      <p:sp>
-        <p:nvSpPr>
-          <p:cNvPr id="8" name="Tekstikehys 7"/>
-          <p:cNvSpPr txBox="1"/>
-          <p:nvPr/>
-        </p:nvSpPr>
-        <p:spPr>
-          <a:xfrm>
-            <a:off x="1979712" y="3967896"/>
-            <a:ext cx="6343795" cy="2031325"/>
-          </a:xfrm>
-          <a:prstGeom prst="rect">
-            <a:avLst/>
-          </a:prstGeom>
-          <a:noFill/>
-        </p:spPr>
-        <p:txBody>
-          <a:bodyPr wrap="square" rtlCol="0">
-            <a:spAutoFit/>
-          </a:bodyPr>
-          <a:lstStyle/>
-          <a:p>
-            <a:r>
-              <a:rPr lang="fi-FI" dirty="0" err="1" smtClean="0"/>
-              <a:t>Very</a:t>
-            </a:r>
-            <a:r>
-              <a:rPr lang="fi-FI" dirty="0" smtClean="0"/>
-              <a:t> common in </a:t>
-            </a:r>
-            <a:r>
-              <a:rPr lang="fi-FI" dirty="0" err="1" smtClean="0"/>
-              <a:t>job</a:t>
-            </a:r>
-            <a:r>
-              <a:rPr lang="fi-FI" dirty="0" smtClean="0"/>
-              <a:t> </a:t>
-            </a:r>
-            <a:r>
-              <a:rPr lang="fi-FI" dirty="0" err="1" smtClean="0"/>
-              <a:t>ads</a:t>
-            </a:r>
-            <a:r>
-              <a:rPr lang="fi-FI" dirty="0" smtClean="0"/>
-              <a:t> </a:t>
-            </a:r>
-            <a:r>
-              <a:rPr lang="fi-FI" dirty="0" err="1" smtClean="0"/>
-              <a:t>nowadays</a:t>
-            </a:r>
-            <a:r>
-              <a:rPr lang="fi-FI" dirty="0" smtClean="0"/>
-              <a:t>:</a:t>
-            </a:r>
-          </a:p>
-          <a:p>
-            <a:pPr marL="285750" indent="-285750">
-              <a:buFont typeface="Arial"/>
+            <a:r>
+              <a:rPr lang="fi-FI" sz="2000" dirty="0"/>
+              <a:t>Työpaikkailmoituksista usein haettua: </a:t>
+            </a:r>
+          </a:p>
+          <a:p>
+            <a:pPr>
+              <a:buFont typeface="Arial" pitchFamily="34" charset="0"/>
               <a:buChar char="•"/>
             </a:pPr>
             <a:r>
-              <a:rPr lang="fi-FI" dirty="0" err="1" smtClean="0"/>
-              <a:t>Looking</a:t>
-            </a:r>
-            <a:r>
-              <a:rPr lang="fi-FI" dirty="0" smtClean="0"/>
-              <a:t> for a Technical </a:t>
-            </a:r>
-            <a:r>
-              <a:rPr lang="fi-FI" dirty="0" err="1" smtClean="0"/>
-              <a:t>Tester</a:t>
-            </a:r>
-            <a:r>
-              <a:rPr lang="fi-FI" dirty="0" smtClean="0"/>
-              <a:t> / Software </a:t>
-            </a:r>
-            <a:r>
-              <a:rPr lang="fi-FI" dirty="0" err="1" smtClean="0"/>
-              <a:t>Developer</a:t>
-            </a:r>
-            <a:r>
-              <a:rPr lang="fi-FI" dirty="0" smtClean="0"/>
-              <a:t> in </a:t>
-            </a:r>
-            <a:r>
-              <a:rPr lang="fi-FI" dirty="0" err="1" smtClean="0"/>
-              <a:t>Test</a:t>
-            </a:r>
-            <a:r>
-              <a:rPr lang="fi-FI" dirty="0" smtClean="0"/>
-              <a:t> to </a:t>
-            </a:r>
-            <a:r>
-              <a:rPr lang="fi-FI" dirty="0" err="1" smtClean="0"/>
-              <a:t>automate</a:t>
-            </a:r>
-            <a:r>
-              <a:rPr lang="fi-FI" dirty="0" smtClean="0"/>
-              <a:t>…</a:t>
-            </a:r>
-          </a:p>
-          <a:p>
-            <a:pPr marL="285750" indent="-285750">
-              <a:buFont typeface="Arial"/>
+              <a:rPr lang="fi-FI" sz="2000" dirty="0"/>
+              <a:t> Tekninen testaaja / automatisointi</a:t>
+            </a:r>
+          </a:p>
+          <a:p>
+            <a:pPr>
+              <a:buFont typeface="Arial" pitchFamily="34" charset="0"/>
               <a:buChar char="•"/>
             </a:pPr>
-            <a:endParaRPr lang="fi-FI" dirty="0"/>
-          </a:p>
-          <a:p>
-            <a:pPr marL="285750" indent="-285750">
-              <a:buFont typeface="Arial"/>
-              <a:buChar char="•"/>
-            </a:pPr>
-            <a:r>
-              <a:rPr lang="fi-FI" dirty="0" smtClean="0"/>
-              <a:t>”…</a:t>
-            </a:r>
-            <a:r>
-              <a:rPr lang="fi-FI" dirty="0" err="1" smtClean="0"/>
-              <a:t>our</a:t>
-            </a:r>
-            <a:r>
-              <a:rPr lang="fi-FI" dirty="0" smtClean="0"/>
-              <a:t> </a:t>
-            </a:r>
-            <a:r>
-              <a:rPr lang="fi-FI" dirty="0" err="1" smtClean="0"/>
-              <a:t>customer</a:t>
-            </a:r>
-            <a:r>
-              <a:rPr lang="fi-FI" dirty="0" smtClean="0"/>
-              <a:t> </a:t>
-            </a:r>
-            <a:r>
-              <a:rPr lang="fi-FI" dirty="0" err="1" smtClean="0"/>
-              <a:t>will</a:t>
-            </a:r>
-            <a:r>
-              <a:rPr lang="fi-FI" dirty="0" smtClean="0"/>
-              <a:t> </a:t>
-            </a:r>
-            <a:r>
-              <a:rPr lang="fi-FI" dirty="0" err="1" smtClean="0"/>
-              <a:t>start</a:t>
-            </a:r>
-            <a:r>
-              <a:rPr lang="fi-FI" dirty="0" smtClean="0"/>
-              <a:t> with an </a:t>
-            </a:r>
-            <a:r>
-              <a:rPr lang="fi-FI" dirty="0" err="1" smtClean="0"/>
-              <a:t>agile</a:t>
-            </a:r>
-            <a:r>
-              <a:rPr lang="fi-FI" dirty="0" smtClean="0"/>
-              <a:t> </a:t>
-            </a:r>
-            <a:r>
-              <a:rPr lang="fi-FI" dirty="0" err="1" smtClean="0"/>
-              <a:t>team</a:t>
-            </a:r>
-            <a:r>
-              <a:rPr lang="fi-FI" dirty="0" smtClean="0"/>
-              <a:t> of </a:t>
-            </a:r>
-            <a:r>
-              <a:rPr lang="fi-FI" dirty="0" err="1" smtClean="0"/>
-              <a:t>three</a:t>
-            </a:r>
-            <a:r>
-              <a:rPr lang="fi-FI" dirty="0" smtClean="0"/>
-              <a:t> </a:t>
-            </a:r>
-            <a:r>
-              <a:rPr lang="fi-FI" dirty="0" err="1" smtClean="0"/>
-              <a:t>developers</a:t>
-            </a:r>
-            <a:r>
-              <a:rPr lang="fi-FI" dirty="0" smtClean="0"/>
-              <a:t> and </a:t>
-            </a:r>
-            <a:r>
-              <a:rPr lang="fi-FI" dirty="0" err="1" smtClean="0"/>
-              <a:t>see</a:t>
-            </a:r>
-            <a:r>
-              <a:rPr lang="fi-FI" dirty="0" smtClean="0"/>
-              <a:t> </a:t>
-            </a:r>
-            <a:r>
-              <a:rPr lang="fi-FI" dirty="0" err="1" smtClean="0"/>
-              <a:t>later</a:t>
-            </a:r>
-            <a:r>
-              <a:rPr lang="fi-FI" dirty="0" smtClean="0"/>
-              <a:t> </a:t>
-            </a:r>
-            <a:r>
-              <a:rPr lang="fi-FI" dirty="0" err="1" smtClean="0"/>
-              <a:t>if</a:t>
-            </a:r>
-            <a:r>
-              <a:rPr lang="fi-FI" dirty="0" smtClean="0"/>
-              <a:t> </a:t>
-            </a:r>
-            <a:r>
-              <a:rPr lang="fi-FI" dirty="0" err="1" smtClean="0"/>
-              <a:t>they</a:t>
-            </a:r>
-            <a:r>
-              <a:rPr lang="fi-FI" dirty="0" smtClean="0"/>
-              <a:t> </a:t>
-            </a:r>
-            <a:r>
-              <a:rPr lang="fi-FI" dirty="0" err="1" smtClean="0"/>
-              <a:t>need</a:t>
-            </a:r>
-            <a:r>
-              <a:rPr lang="fi-FI" dirty="0" smtClean="0"/>
-              <a:t> a </a:t>
-            </a:r>
-            <a:r>
-              <a:rPr lang="fi-FI" dirty="0" err="1" smtClean="0"/>
-              <a:t>tester</a:t>
-            </a:r>
-            <a:r>
-              <a:rPr lang="fi-FI" dirty="0" smtClean="0"/>
-              <a:t> at </a:t>
-            </a:r>
-            <a:r>
-              <a:rPr lang="fi-FI" dirty="0" err="1" smtClean="0"/>
-              <a:t>all</a:t>
-            </a:r>
-            <a:r>
-              <a:rPr lang="fi-FI" dirty="0" smtClean="0"/>
-              <a:t>”</a:t>
-            </a:r>
-          </a:p>
-          <a:p>
-            <a:endParaRPr lang="fi-FI" dirty="0"/>
+            <a:endParaRPr lang="fi-FI" sz="2000" dirty="0"/>
+          </a:p>
+          <a:p>
+            <a:r>
+              <a:rPr lang="fi-FI" sz="2000" dirty="0"/>
+              <a:t>”…asiakkaamme aloittaa kolmen kehittäjän </a:t>
+            </a:r>
+            <a:r>
+              <a:rPr lang="fi-FI" sz="2000" dirty="0" err="1"/>
+              <a:t>agile-tiimillä</a:t>
+            </a:r>
+            <a:r>
+              <a:rPr lang="fi-FI" sz="2000" dirty="0"/>
+              <a:t> </a:t>
+            </a:r>
+            <a:br>
+              <a:rPr lang="fi-FI" sz="2000" dirty="0"/>
+            </a:br>
+            <a:r>
+              <a:rPr lang="fi-FI" sz="2000" dirty="0"/>
+              <a:t>ja katsoo myöhemmin tarvitseeko testaajaa”</a:t>
+            </a:r>
+            <a:endParaRPr lang="en-US" sz="2000" dirty="0"/>
+          </a:p>
+          <a:p>
+            <a:endParaRPr lang="fi-FI" sz="2000" dirty="0"/>
           </a:p>
         </p:txBody>
       </p:sp>
@@ -7364,7 +7162,27 @@
           <a:p>
             <a:r>
               <a:rPr lang="en-US" dirty="0" smtClean="0"/>
-              <a:t>Piece of Realism: Different Programmers</a:t>
+              <a:t>Pala </a:t>
+            </a:r>
+            <a:r>
+              <a:rPr lang="en-US" dirty="0" err="1" smtClean="0"/>
+              <a:t>todellisuutta</a:t>
+            </a:r>
+            <a:r>
+              <a:rPr lang="en-US" dirty="0" smtClean="0"/>
+              <a:t>: </a:t>
+            </a:r>
+            <a:r>
+              <a:rPr lang="en-US" dirty="0" err="1" smtClean="0"/>
+              <a:t>Erilaisia</a:t>
+            </a:r>
+            <a:r>
+              <a:rPr lang="en-US" dirty="0" smtClean="0"/>
+              <a:t> </a:t>
+            </a:r>
+            <a:r>
+              <a:rPr lang="en-US" dirty="0" err="1" smtClean="0"/>
+              <a:t>ohjelmoijia</a:t>
             </a:r>
             <a:endParaRPr lang="en-US" dirty="0"/>
           </a:p>
@@ -7383,18 +7201,34 @@
         <p:spPr>
           <a:xfrm>
             <a:off x="457200" y="1600200"/>
-            <a:ext cx="5305487" cy="4525963"/>
+            <a:ext cx="5870905" cy="4525963"/>
           </a:xfrm>
         </p:spPr>
         <p:txBody>
           <a:bodyPr>
-            <a:normAutofit fontScale="85000" lnSpcReduction="20000"/>
+            <a:normAutofit fontScale="92500" lnSpcReduction="10000"/>
           </a:bodyPr>
           <a:lstStyle/>
           <a:p>
             <a:r>
               <a:rPr lang="en-US" dirty="0" smtClean="0"/>
-              <a:t>‘Hello World’ Programmer / ‘</a:t>
+              <a:t>‘Hello World’ </a:t>
+            </a:r>
+            <a:r>
+              <a:rPr lang="en-US" dirty="0" smtClean="0"/>
+              <a:t>-</a:t>
+            </a:r>
+            <a:r>
+              <a:rPr lang="en-US" dirty="0" err="1" smtClean="0"/>
+              <a:t>ohjelmoija</a:t>
+            </a:r>
+            <a:r>
+              <a:rPr lang="en-US" dirty="0" smtClean="0"/>
+              <a:t>/ </a:t>
+            </a:r>
+            <a:r>
+              <a:rPr lang="en-US" dirty="0" smtClean="0"/>
+              <a:t>‘</a:t>
             </a:r>
             <a:r>
               <a:rPr lang="en-US" dirty="0" err="1" smtClean="0"/>
@@ -7402,40 +7236,83 @@
             </a:r>
             <a:r>
               <a:rPr lang="en-US" dirty="0" smtClean="0"/>
-              <a:t>’ – code school programmer</a:t>
-            </a:r>
-          </a:p>
-          <a:p>
+              <a:t>’ – </a:t>
+            </a:r>
+            <a:r>
+              <a:rPr lang="en-US" dirty="0" err="1" smtClean="0"/>
+              <a:t>koodikoulu</a:t>
+            </a:r>
+            <a:r>
+              <a:rPr lang="en-US" dirty="0" smtClean="0"/>
+              <a:t> -</a:t>
+            </a:r>
+            <a:r>
+              <a:rPr lang="en-US" dirty="0" err="1" smtClean="0"/>
+              <a:t>ohjelmoija</a:t>
+            </a:r>
             <a:endParaRPr lang="en-US" dirty="0"/>
           </a:p>
           <a:p>
+            <a:endParaRPr lang="en-US" dirty="0" smtClean="0"/>
+          </a:p>
+          <a:p>
+            <a:r>
+              <a:rPr lang="en-US" dirty="0" err="1" smtClean="0"/>
+              <a:t>Selviää</a:t>
+            </a:r>
             <a:r>
               <a:rPr lang="en-US" dirty="0" smtClean="0"/>
-              <a:t>Survives in work environments –programmer</a:t>
-            </a:r>
+              <a:t> </a:t>
+            </a:r>
+            <a:r>
+              <a:rPr lang="en-US" dirty="0" err="1" smtClean="0"/>
+              <a:t>työelämässä</a:t>
+            </a:r>
+            <a:r>
+              <a:rPr lang="en-US" dirty="0" smtClean="0"/>
+              <a:t> -</a:t>
+            </a:r>
+            <a:r>
+              <a:rPr lang="en-US" dirty="0" err="1" smtClean="0"/>
+              <a:t>ohjelmoija</a:t>
+            </a:r>
+            <a:endParaRPr lang="en-US" dirty="0" smtClean="0"/>
           </a:p>
           <a:p>
             <a:pPr lvl="1"/>
             <a:r>
+              <a:rPr lang="fi-FI" dirty="0"/>
+              <a:t>”Määrittelyt” ulkopuolelta</a:t>
+            </a:r>
+          </a:p>
+          <a:p>
+            <a:pPr lvl="1"/>
+            <a:r>
+              <a:rPr lang="fi-FI" dirty="0"/>
+              <a:t>Yksi tapa ratkaista; rajallinen </a:t>
+            </a:r>
+            <a:br>
+              <a:rPr lang="fi-FI" dirty="0"/>
+            </a:br>
+            <a:r>
+              <a:rPr lang="fi-FI" dirty="0"/>
+              <a:t>ylläpidettävyys</a:t>
+            </a:r>
+          </a:p>
+          <a:p>
+            <a:pPr marL="457200" lvl="1" indent="0">
+              <a:buNone/>
+            </a:pPr>
+            <a:endParaRPr lang="en-US" dirty="0"/>
+          </a:p>
+          <a:p>
+            <a:r>
               <a:rPr lang="en-US" dirty="0" smtClean="0"/>
-              <a:t>“Specifications” handed ready from the outside</a:t>
-            </a:r>
-          </a:p>
-          <a:p>
-            <a:pPr lvl="1"/>
-            <a:r>
-              <a:rPr lang="en-US" dirty="0" smtClean="0"/>
-              <a:t>One way to implement; limited maintainability of code</a:t>
-            </a:r>
-          </a:p>
-          <a:p>
-            <a:pPr lvl="1"/>
-            <a:endParaRPr lang="en-US" dirty="0"/>
-          </a:p>
-          <a:p>
-            <a:r>
-              <a:rPr lang="en-US" dirty="0" smtClean="0"/>
-              <a:t>Full-stack Developer</a:t>
+              <a:t>Full-stack </a:t>
+            </a:r>
+            <a:r>
+              <a:rPr lang="en-US" dirty="0" err="1" smtClean="0"/>
+              <a:t>kehittäjä</a:t>
             </a:r>
             <a:endParaRPr lang="en-US" dirty="0"/>
           </a:p>
@@ -7449,8 +7326,8 @@
         </p:nvSpPr>
         <p:spPr>
           <a:xfrm>
-            <a:off x="6558846" y="2369729"/>
-            <a:ext cx="2241690" cy="2426604"/>
+            <a:off x="6558846" y="2369728"/>
+            <a:ext cx="2241690" cy="3067645"/>
           </a:xfrm>
           <a:prstGeom prst="rect">
             <a:avLst/>
@@ -7488,8 +7365,8 @@
           <a:p>
             <a:pPr algn="ctr"/>
             <a:r>
-              <a:rPr lang="en-US" sz="2800" dirty="0" smtClean="0"/>
-              <a:t>Test Automation is a form of Programming</a:t>
+              <a:rPr lang="fi-FI" sz="2800" dirty="0"/>
+              <a:t>Testi-automaatio on koodaamisen yksi sovellusalue</a:t>
             </a:r>
             <a:endParaRPr lang="en-US" sz="2800" dirty="0"/>
           </a:p>
@@ -7572,7 +7449,7 @@
         <p:spPr>
           <a:xfrm>
             <a:off x="834077" y="2464522"/>
-            <a:ext cx="7677260" cy="1754327"/>
+            <a:ext cx="7677260" cy="2585323"/>
           </a:xfrm>
           <a:prstGeom prst="rect">
             <a:avLst/>
@@ -7587,8 +7464,52 @@
           <a:p>
             <a:pPr algn="ctr"/>
             <a:r>
+              <a:rPr lang="en-US" sz="5400" dirty="0" err="1" smtClean="0"/>
+              <a:t>Ei</a:t>
+            </a:r>
+            <a:r>
+              <a:rPr lang="en-US" sz="5400" dirty="0" err="1" smtClean="0"/>
+              <a:t>-koodaavat</a:t>
+            </a:r>
+            <a:r>
               <a:rPr lang="en-US" sz="5400" dirty="0" smtClean="0"/>
-              <a:t>Non-Programming Testers spread out to fill the gaps.</a:t>
+              <a:t> </a:t>
+            </a:r>
+            <a:r>
+              <a:rPr lang="en-US" sz="5400" dirty="0" err="1" smtClean="0"/>
+              <a:t>testaajat</a:t>
+            </a:r>
+            <a:r>
+              <a:rPr lang="en-US" sz="5400" dirty="0" smtClean="0"/>
+              <a:t> </a:t>
+            </a:r>
+            <a:r>
+              <a:rPr lang="en-US" sz="5400" dirty="0" err="1" smtClean="0"/>
+              <a:t>levittäytyvät</a:t>
+            </a:r>
+            <a:r>
+              <a:rPr lang="en-US" sz="5400" dirty="0" smtClean="0"/>
+              <a:t> </a:t>
+            </a:r>
+            <a:r>
+              <a:rPr lang="en-US" sz="5400" dirty="0" err="1" smtClean="0"/>
+              <a:t>täyttämään</a:t>
+            </a:r>
+            <a:r>
+              <a:rPr lang="en-US" sz="5400" dirty="0" smtClean="0"/>
+              <a:t> </a:t>
+            </a:r>
+            <a:r>
+              <a:rPr lang="en-US" sz="5400" dirty="0" err="1" smtClean="0"/>
+              <a:t>syntyviä</a:t>
+            </a:r>
+            <a:r>
+              <a:rPr lang="en-US" sz="5400" dirty="0" smtClean="0"/>
+              <a:t> </a:t>
+            </a:r>
+            <a:r>
+              <a:rPr lang="en-US" sz="5400" dirty="0" err="1" smtClean="0"/>
+              <a:t>aukkoja</a:t>
             </a:r>
             <a:endParaRPr lang="en-US" sz="5400" dirty="0"/>
           </a:p>
@@ -7643,23 +7564,11 @@
           <a:p>
             <a:r>
               <a:rPr lang="fi-FI" dirty="0" smtClean="0"/>
-              <a:t>I </a:t>
-            </a:r>
-            <a:r>
-              <a:rPr lang="fi-FI" dirty="0" err="1" smtClean="0"/>
-              <a:t>Test</a:t>
+              <a:t>Testaan näitä </a:t>
             </a:r>
             <a:r>
               <a:rPr lang="fi-FI" dirty="0" smtClean="0"/>
-              <a:t> </a:t>
-            </a:r>
-            <a:r>
-              <a:rPr lang="fi-FI" dirty="0" err="1" smtClean="0"/>
-              <a:t>These</a:t>
-            </a:r>
-            <a:r>
-              <a:rPr lang="fi-FI" dirty="0" smtClean="0"/>
-              <a:t> </a:t>
+              <a:t/>
             </a:r>
             <a:br>
               <a:rPr lang="fi-FI" dirty="0" smtClean="0"/>
@@ -7669,12 +7578,16 @@
               <a:t>					… </a:t>
             </a:r>
             <a:r>
-              <a:rPr lang="fi-FI" dirty="0" err="1" smtClean="0"/>
-              <a:t>Since</a:t>
-            </a:r>
-            <a:r>
               <a:rPr lang="fi-FI" dirty="0" smtClean="0"/>
-              <a:t> 04/2012</a:t>
+              <a:t>04</a:t>
+            </a:r>
+            <a:r>
+              <a:rPr lang="fi-FI" dirty="0" smtClean="0"/>
+              <a:t>/</a:t>
+            </a:r>
+            <a:r>
+              <a:rPr lang="fi-FI" dirty="0" smtClean="0"/>
+              <a:t>2012 alkaen</a:t>
             </a:r>
             <a:endParaRPr lang="en-US" dirty="0"/>
           </a:p>
@@ -7721,8 +7634,8 @@
         </p:nvSpPr>
         <p:spPr>
           <a:xfrm>
-            <a:off x="323850" y="2636912"/>
-            <a:ext cx="1091966" cy="461665"/>
+            <a:off x="56466" y="2636912"/>
+            <a:ext cx="1597613" cy="461665"/>
           </a:xfrm>
           <a:prstGeom prst="rect">
             <a:avLst/>
@@ -7740,8 +7653,8 @@
               <a:t>9 </a:t>
             </a:r>
             <a:r>
-              <a:rPr lang="fi-FI" sz="2400" dirty="0" err="1" smtClean="0"/>
-              <a:t>devs</a:t>
+              <a:rPr lang="fi-FI" sz="2400" dirty="0" smtClean="0"/>
+              <a:t>kehittäjää</a:t>
             </a:r>
             <a:endParaRPr lang="en-US" sz="2400" dirty="0"/>
           </a:p>
@@ -7756,7 +7669,7 @@
         <p:spPr>
           <a:xfrm>
             <a:off x="7512482" y="2679303"/>
-            <a:ext cx="1091966" cy="461665"/>
+            <a:ext cx="1597613" cy="461665"/>
           </a:xfrm>
           <a:prstGeom prst="rect">
             <a:avLst/>
@@ -7774,8 +7687,8 @@
               <a:t>6 </a:t>
             </a:r>
             <a:r>
-              <a:rPr lang="fi-FI" sz="2400" dirty="0" err="1" smtClean="0"/>
-              <a:t>devs</a:t>
+              <a:rPr lang="fi-FI" sz="2400" dirty="0" smtClean="0"/>
+              <a:t>kehittäjää</a:t>
             </a:r>
             <a:endParaRPr lang="en-US" sz="2400" dirty="0"/>
           </a:p>
@@ -7789,8 +7702,8 @@
         </p:nvSpPr>
         <p:spPr>
           <a:xfrm>
-            <a:off x="104386" y="3183359"/>
-            <a:ext cx="1587294" cy="461665"/>
+            <a:off x="-29306" y="3183359"/>
+            <a:ext cx="1875934" cy="830997"/>
           </a:xfrm>
           <a:prstGeom prst="rect">
             <a:avLst/>
@@ -7803,17 +7716,17 @@
           </a:bodyPr>
           <a:lstStyle/>
           <a:p>
-            <a:r>
-              <a:rPr lang="fi-FI" sz="2400" dirty="0" err="1" smtClean="0"/>
-              <a:t>PdM</a:t>
-            </a:r>
+            <a:pPr algn="ctr"/>
             <a:r>
               <a:rPr lang="fi-FI" sz="2400" dirty="0" smtClean="0"/>
-              <a:t> </a:t>
-            </a:r>
-            <a:r>
-              <a:rPr lang="fi-FI" sz="2400" dirty="0" err="1" smtClean="0"/>
-              <a:t>team</a:t>
+              <a:t>Tuotehallinta-</a:t>
+            </a:r>
+            <a:br>
+              <a:rPr lang="fi-FI" sz="2400" dirty="0" smtClean="0"/>
+            </a:br>
+            <a:r>
+              <a:rPr lang="fi-FI" sz="2400" dirty="0" smtClean="0"/>
+              <a:t>tiimi</a:t>
             </a:r>
             <a:endParaRPr lang="en-US" sz="2400" dirty="0"/>
           </a:p>
@@ -7828,7 +7741,7 @@
         <p:spPr>
           <a:xfrm>
             <a:off x="7668344" y="3212976"/>
-            <a:ext cx="817853" cy="461665"/>
+            <a:ext cx="1268346" cy="830997"/>
           </a:xfrm>
           <a:prstGeom prst="rect">
             <a:avLst/>
@@ -7841,11 +7754,23 @@
           </a:bodyPr>
           <a:lstStyle/>
           <a:p>
-            <a:r>
-              <a:rPr lang="fi-FI" sz="2400" dirty="0" err="1" smtClean="0"/>
-              <a:t>PdM</a:t>
-            </a:r>
-            <a:endParaRPr lang="en-US" sz="2400" dirty="0"/>
+            <a:pPr algn="ctr"/>
+            <a:r>
+              <a:rPr lang="fi-FI" sz="2400" dirty="0" smtClean="0"/>
+              <a:t>Tuote-</a:t>
+            </a:r>
+            <a:r>
+              <a:rPr lang="en-US" sz="2400" dirty="0"/>
+              <a:t/>
+            </a:r>
+            <a:br>
+              <a:rPr lang="en-US" sz="2400" dirty="0"/>
+            </a:br>
+            <a:r>
+              <a:rPr lang="en-US" sz="2400" dirty="0" err="1" smtClean="0"/>
+              <a:t>päällikkö</a:t>
+            </a:r>
+            <a:endParaRPr lang="fi-FI" sz="2400" dirty="0" smtClean="0"/>
           </a:p>
         </p:txBody>
       </p:sp>
@@ -7858,7 +7783,7 @@
         <p:spPr>
           <a:xfrm>
             <a:off x="3295638" y="4992153"/>
-            <a:ext cx="2337298" cy="461665"/>
+            <a:ext cx="2953152" cy="461665"/>
           </a:xfrm>
           <a:prstGeom prst="rect">
             <a:avLst/>
@@ -7873,23 +7798,11 @@
           <a:p>
             <a:r>
               <a:rPr lang="fi-FI" sz="2400" dirty="0" smtClean="0"/>
-              <a:t>2 ’</a:t>
-            </a:r>
-            <a:r>
-              <a:rPr lang="fi-FI" sz="2400" dirty="0" err="1" smtClean="0"/>
-              <a:t>system</a:t>
+              <a:t>2 </a:t>
             </a:r>
             <a:r>
               <a:rPr lang="fi-FI" sz="2400" dirty="0" smtClean="0"/>
-              <a:t> </a:t>
-            </a:r>
-            <a:r>
-              <a:rPr lang="fi-FI" sz="2400" dirty="0" err="1" smtClean="0"/>
-              <a:t>testers</a:t>
-            </a:r>
-            <a:r>
-              <a:rPr lang="fi-FI" sz="2400" dirty="0" smtClean="0"/>
-              <a:t>’</a:t>
+              <a:t>’järjestelmätestaajaa’</a:t>
             </a:r>
             <a:endParaRPr lang="en-US" sz="2400" dirty="0"/>
           </a:p>
@@ -7904,7 +7817,7 @@
         <p:spPr>
           <a:xfrm>
             <a:off x="7452320" y="4139788"/>
-            <a:ext cx="1595309" cy="369332"/>
+            <a:ext cx="1326004" cy="646331"/>
           </a:xfrm>
           <a:prstGeom prst="rect">
             <a:avLst/>
@@ -7917,17 +7830,21 @@
           </a:bodyPr>
           <a:lstStyle/>
           <a:p>
+            <a:pPr algn="ctr"/>
             <a:r>
               <a:rPr lang="fi-FI" dirty="0" smtClean="0"/>
               <a:t>… </a:t>
             </a:r>
             <a:r>
-              <a:rPr lang="fi-FI" dirty="0" err="1" smtClean="0"/>
-              <a:t>since</a:t>
-            </a:r>
-            <a:r>
               <a:rPr lang="fi-FI" dirty="0" smtClean="0"/>
-              <a:t> 2012</a:t>
+              <a:t>vuodesta </a:t>
+            </a:r>
+            <a:br>
+              <a:rPr lang="fi-FI" dirty="0" smtClean="0"/>
+            </a:br>
+            <a:r>
+              <a:rPr lang="fi-FI" dirty="0" smtClean="0"/>
+              <a:t>2012</a:t>
             </a:r>
             <a:endParaRPr lang="en-US" dirty="0"/>
           </a:p>
@@ -7942,7 +7859,7 @@
         <p:spPr>
           <a:xfrm>
             <a:off x="-36512" y="4221088"/>
-            <a:ext cx="1729961" cy="369332"/>
+            <a:ext cx="1326004" cy="646331"/>
           </a:xfrm>
           <a:prstGeom prst="rect">
             <a:avLst/>
@@ -7955,17 +7872,25 @@
           </a:bodyPr>
           <a:lstStyle/>
           <a:p>
+            <a:pPr algn="ctr"/>
             <a:r>
               <a:rPr lang="fi-FI" dirty="0" smtClean="0"/>
               <a:t>… </a:t>
             </a:r>
             <a:r>
-              <a:rPr lang="fi-FI" dirty="0" err="1" smtClean="0"/>
-              <a:t>since</a:t>
-            </a:r>
-            <a:r>
               <a:rPr lang="fi-FI" dirty="0" smtClean="0"/>
-              <a:t> ~2009</a:t>
+              <a:t>vuodesta </a:t>
+            </a:r>
+            <a:br>
+              <a:rPr lang="fi-FI" dirty="0" smtClean="0"/>
+            </a:br>
+            <a:r>
+              <a:rPr lang="fi-FI" dirty="0" smtClean="0"/>
+              <a:t>~</a:t>
+            </a:r>
+            <a:r>
+              <a:rPr lang="fi-FI" dirty="0" smtClean="0"/>
+              <a:t>2009</a:t>
             </a:r>
             <a:endParaRPr lang="en-US" dirty="0"/>
           </a:p>
@@ -8027,52 +7952,8 @@
           <a:lstStyle/>
           <a:p>
             <a:r>
-              <a:rPr lang="fi-FI" dirty="0" err="1" smtClean="0"/>
-              <a:t>Examples</a:t>
-            </a:r>
-            <a:r>
               <a:rPr lang="fi-FI" dirty="0" smtClean="0"/>
-              <a:t> of </a:t>
-            </a:r>
-            <a:r>
-              <a:rPr lang="fi-FI" dirty="0" err="1" smtClean="0"/>
-              <a:t>What</a:t>
-            </a:r>
-            <a:r>
-              <a:rPr lang="fi-FI" dirty="0" smtClean="0"/>
-              <a:t> I </a:t>
-            </a:r>
-            <a:r>
-              <a:rPr lang="fi-FI" dirty="0" err="1" smtClean="0"/>
-              <a:t>Do</a:t>
-            </a:r>
-            <a:r>
-              <a:rPr lang="fi-FI" dirty="0" smtClean="0"/>
-              <a:t> at </a:t>
-            </a:r>
-            <a:r>
-              <a:rPr lang="fi-FI" dirty="0" err="1" smtClean="0"/>
-              <a:t>Work</a:t>
-            </a:r>
-            <a:r>
-              <a:rPr lang="fi-FI" dirty="0" smtClean="0"/>
-              <a:t> as ’</a:t>
-            </a:r>
-            <a:r>
-              <a:rPr lang="fi-FI" dirty="0" err="1" smtClean="0"/>
-              <a:t>Testing</a:t>
-            </a:r>
-            <a:r>
-              <a:rPr lang="fi-FI" dirty="0" smtClean="0"/>
-              <a:t> </a:t>
-            </a:r>
-            <a:r>
-              <a:rPr lang="fi-FI" dirty="0" err="1" smtClean="0"/>
-              <a:t>Specialist</a:t>
-            </a:r>
-            <a:r>
-              <a:rPr lang="fi-FI" dirty="0" smtClean="0"/>
-              <a:t>’ </a:t>
+              <a:t>Esimerkkejä työstäni ’testausasiantuntijana’</a:t>
             </a:r>
             <a:endParaRPr lang="en-US" dirty="0"/>
           </a:p>
@@ -8095,458 +7976,78 @@
           </a:bodyPr>
           <a:lstStyle/>
           <a:p>
-            <a:r>
-              <a:rPr lang="fi-FI" sz="1800" dirty="0" err="1" smtClean="0">
-                <a:solidFill>
-                  <a:schemeClr val="accent3"/>
-                </a:solidFill>
-              </a:rPr>
-              <a:t>Learn</a:t>
-            </a:r>
             <a:r>
               <a:rPr lang="fi-FI" sz="1800" dirty="0" smtClean="0">
                 <a:solidFill>
                   <a:schemeClr val="accent3"/>
                 </a:solidFill>
               </a:rPr>
-              <a:t> </a:t>
-            </a:r>
-            <a:r>
-              <a:rPr lang="fi-FI" sz="1800" dirty="0" err="1" smtClean="0">
-                <a:solidFill>
-                  <a:schemeClr val="accent3"/>
-                </a:solidFill>
-              </a:rPr>
-              <a:t>why</a:t>
-            </a:r>
-            <a:r>
-              <a:rPr lang="fi-FI" sz="1800" dirty="0" smtClean="0">
-                <a:solidFill>
-                  <a:schemeClr val="accent3"/>
-                </a:solidFill>
-              </a:rPr>
-              <a:t> the </a:t>
-            </a:r>
-            <a:r>
-              <a:rPr lang="fi-FI" sz="1800" dirty="0" err="1" smtClean="0">
-                <a:solidFill>
-                  <a:schemeClr val="accent3"/>
-                </a:solidFill>
-              </a:rPr>
-              <a:t>product</a:t>
-            </a:r>
-            <a:r>
-              <a:rPr lang="fi-FI" sz="1800" dirty="0" smtClean="0">
-                <a:solidFill>
-                  <a:schemeClr val="accent3"/>
-                </a:solidFill>
-              </a:rPr>
-              <a:t> </a:t>
-            </a:r>
-            <a:r>
-              <a:rPr lang="fi-FI" sz="1800" dirty="0" err="1" smtClean="0">
-                <a:solidFill>
-                  <a:schemeClr val="accent3"/>
-                </a:solidFill>
-              </a:rPr>
-              <a:t>exists</a:t>
-            </a:r>
-            <a:r>
-              <a:rPr lang="fi-FI" sz="1800" dirty="0" smtClean="0">
-                <a:solidFill>
-                  <a:schemeClr val="accent3"/>
-                </a:solidFill>
-              </a:rPr>
-              <a:t> &amp; </a:t>
-            </a:r>
-            <a:r>
-              <a:rPr lang="fi-FI" sz="1800" dirty="0" err="1" smtClean="0">
-                <a:solidFill>
-                  <a:schemeClr val="accent3"/>
-                </a:solidFill>
-              </a:rPr>
-              <a:t>patiently</a:t>
-            </a:r>
-            <a:r>
-              <a:rPr lang="fi-FI" sz="1800" dirty="0" smtClean="0">
-                <a:solidFill>
-                  <a:schemeClr val="accent3"/>
-                </a:solidFill>
-              </a:rPr>
-              <a:t> </a:t>
-            </a:r>
-            <a:r>
-              <a:rPr lang="fi-FI" sz="1800" dirty="0" err="1" smtClean="0">
-                <a:solidFill>
-                  <a:schemeClr val="accent3"/>
-                </a:solidFill>
-              </a:rPr>
-              <a:t>use</a:t>
-            </a:r>
-            <a:r>
-              <a:rPr lang="fi-FI" sz="1800" dirty="0" smtClean="0">
-                <a:solidFill>
-                  <a:schemeClr val="accent3"/>
-                </a:solidFill>
-              </a:rPr>
-              <a:t> the </a:t>
-            </a:r>
-            <a:r>
-              <a:rPr lang="fi-FI" sz="1800" dirty="0" err="1" smtClean="0">
-                <a:solidFill>
-                  <a:schemeClr val="accent3"/>
-                </a:solidFill>
-              </a:rPr>
-              <a:t>system</a:t>
-            </a:r>
-            <a:r>
-              <a:rPr lang="fi-FI" sz="1800" dirty="0" smtClean="0">
-                <a:solidFill>
-                  <a:schemeClr val="accent3"/>
-                </a:solidFill>
-              </a:rPr>
-              <a:t> in </a:t>
-            </a:r>
-            <a:r>
-              <a:rPr lang="fi-FI" sz="1800" dirty="0" err="1" smtClean="0">
-                <a:solidFill>
-                  <a:schemeClr val="accent3"/>
-                </a:solidFill>
-              </a:rPr>
-              <a:t>varied</a:t>
-            </a:r>
-            <a:r>
-              <a:rPr lang="fi-FI" sz="1800" dirty="0" smtClean="0">
-                <a:solidFill>
-                  <a:schemeClr val="accent3"/>
-                </a:solidFill>
-              </a:rPr>
-              <a:t> </a:t>
-            </a:r>
-            <a:r>
-              <a:rPr lang="fi-FI" sz="1800" dirty="0" err="1" smtClean="0">
-                <a:solidFill>
-                  <a:schemeClr val="accent3"/>
-                </a:solidFill>
-              </a:rPr>
-              <a:t>ways</a:t>
-            </a:r>
-            <a:r>
-              <a:rPr lang="fi-FI" sz="1800" dirty="0" smtClean="0">
-                <a:solidFill>
-                  <a:schemeClr val="accent3"/>
-                </a:solidFill>
-              </a:rPr>
-              <a:t> </a:t>
-            </a:r>
+              <a:t>Opettele miksi tuote on olemassa &amp; käytä kärsivällisesti ja monipuolisin tavoin</a:t>
+            </a:r>
+          </a:p>
+          <a:p>
+            <a:r>
+              <a:rPr lang="fi-FI" sz="1800" dirty="0" smtClean="0"/>
+              <a:t>Anna palautetta / kirjaa havaintoja</a:t>
+            </a:r>
+          </a:p>
+          <a:p>
+            <a:r>
+              <a:rPr lang="fi-FI" sz="1800" dirty="0" smtClean="0"/>
+              <a:t>Työskentele tuotepäällikön &amp; kehittäjän kanssa ominaisuuden selkiyttämiseksi</a:t>
+            </a:r>
+            <a:endParaRPr lang="fi-FI" sz="1800" dirty="0"/>
+          </a:p>
+          <a:p>
+            <a:r>
+              <a:rPr lang="fi-FI" sz="1800" dirty="0" smtClean="0"/>
+              <a:t>Neuvottele pienempi työkuorma </a:t>
+            </a:r>
+            <a:endParaRPr lang="fi-FI" sz="1800" dirty="0" smtClean="0"/>
+          </a:p>
+          <a:p>
+            <a:r>
+              <a:rPr lang="fi-FI" sz="1800" dirty="0" smtClean="0"/>
+              <a:t>Mahdollista koulutukset ja osaamisen kasvattaminen</a:t>
+            </a:r>
+            <a:endParaRPr lang="fi-FI" sz="1800" dirty="0" smtClean="0"/>
           </a:p>
           <a:p>
             <a:r>
               <a:rPr lang="fi-FI" sz="1800" dirty="0" err="1" smtClean="0"/>
-              <a:t>Provide</a:t>
+              <a:t>Parityöskentele</a:t>
             </a:r>
             <a:r>
               <a:rPr lang="fi-FI" sz="1800" dirty="0" smtClean="0"/>
-              <a:t> feedback / </a:t>
-            </a:r>
+              <a:t> kehittäjien kanssa </a:t>
+            </a:r>
+            <a:r>
+              <a:rPr lang="fi-FI" sz="1800" dirty="0" smtClean="0"/>
+              <a:t>yhteisen laatukokemuksen saamiseksi </a:t>
+            </a:r>
+          </a:p>
+          <a:p>
             <a:r>
               <a:rPr lang="fi-FI" sz="1800" dirty="0" err="1" smtClean="0"/>
-              <a:t>log</a:t>
+              <a:t>Parityöskentele</a:t>
             </a:r>
             <a:r>
               <a:rPr lang="fi-FI" sz="1800" dirty="0" smtClean="0"/>
-              <a:t> </a:t>
-            </a:r>
-            <a:r>
-              <a:rPr lang="fi-FI" sz="1800" dirty="0" err="1" smtClean="0"/>
-              <a:t>bugs</a:t>
+              <a:t> koodin parissa</a:t>
             </a:r>
             <a:endParaRPr lang="fi-FI" sz="1800" dirty="0" smtClean="0"/>
           </a:p>
           <a:p>
             <a:r>
-              <a:rPr lang="fi-FI" sz="1800" dirty="0" err="1" smtClean="0"/>
-              <a:t>Work</a:t>
-            </a:r>
-            <a:r>
               <a:rPr lang="fi-FI" sz="1800" dirty="0" smtClean="0"/>
-              <a:t> </a:t>
-            </a:r>
-            <a:r>
-              <a:rPr lang="fi-FI" sz="1800" dirty="0" err="1" smtClean="0"/>
-              <a:t>with</a:t>
-            </a:r>
+              <a:t>Haasta vaatimuksia tuotehallinnalta</a:t>
+            </a:r>
+            <a:endParaRPr lang="fi-FI" sz="1800" dirty="0" smtClean="0"/>
+          </a:p>
+          <a:p>
             <a:r>
               <a:rPr lang="fi-FI" sz="1800" dirty="0" smtClean="0"/>
-              <a:t> </a:t>
-            </a:r>
-            <a:r>
-              <a:rPr lang="fi-FI" sz="1800" dirty="0" err="1" smtClean="0"/>
-              <a:t>product</a:t>
-            </a:r>
-            <a:r>
-              <a:rPr lang="fi-FI" sz="1800" dirty="0" smtClean="0"/>
-              <a:t> </a:t>
-            </a:r>
-            <a:r>
-              <a:rPr lang="fi-FI" sz="1800" dirty="0" err="1" smtClean="0"/>
-              <a:t>manager</a:t>
-            </a:r>
-            <a:r>
-              <a:rPr lang="fi-FI" sz="1800" dirty="0" smtClean="0"/>
-              <a:t> &amp; </a:t>
-            </a:r>
-            <a:r>
-              <a:rPr lang="fi-FI" sz="1800" dirty="0" err="1" smtClean="0"/>
-              <a:t>developer</a:t>
-            </a:r>
-            <a:r>
-              <a:rPr lang="fi-FI" sz="1800" dirty="0" smtClean="0"/>
-              <a:t> to </a:t>
-            </a:r>
-            <a:r>
-              <a:rPr lang="fi-FI" sz="1800" dirty="0" err="1" smtClean="0"/>
-              <a:t>clarify</a:t>
-            </a:r>
-            <a:r>
-              <a:rPr lang="fi-FI" sz="1800" dirty="0" smtClean="0"/>
-              <a:t> a feature</a:t>
-            </a:r>
-          </a:p>
-          <a:p>
-            <a:r>
-              <a:rPr lang="fi-FI" sz="1800" dirty="0" err="1" smtClean="0"/>
-              <a:t>Negotiate</a:t>
-            </a:r>
-            <a:r>
-              <a:rPr lang="fi-FI" sz="1800" dirty="0" smtClean="0"/>
-              <a:t> </a:t>
-            </a:r>
-            <a:r>
-              <a:rPr lang="fi-FI" sz="1800" dirty="0" err="1" smtClean="0"/>
-              <a:t>smaller</a:t>
-            </a:r>
-            <a:r>
-              <a:rPr lang="fi-FI" sz="1800" dirty="0" smtClean="0"/>
-              <a:t> </a:t>
-            </a:r>
-            <a:r>
-              <a:rPr lang="fi-FI" sz="1800" dirty="0" err="1" smtClean="0"/>
-              <a:t>workload</a:t>
-            </a:r>
-            <a:r>
-              <a:rPr lang="fi-FI" sz="1800" dirty="0" smtClean="0"/>
-              <a:t> for the </a:t>
-            </a:r>
-            <a:r>
-              <a:rPr lang="fi-FI" sz="1800" dirty="0" err="1" smtClean="0"/>
-              <a:t>team</a:t>
-            </a:r>
-            <a:endParaRPr lang="fi-FI" sz="1800" dirty="0" smtClean="0"/>
-          </a:p>
-          <a:p>
-            <a:r>
-              <a:rPr lang="fi-FI" sz="1800" dirty="0" err="1" smtClean="0"/>
-              <a:t>Enable</a:t>
-            </a:r>
-            <a:r>
-              <a:rPr lang="fi-FI" sz="1800" dirty="0" smtClean="0"/>
-              <a:t> </a:t>
-            </a:r>
-            <a:r>
-              <a:rPr lang="fi-FI" sz="1800" dirty="0" err="1" smtClean="0"/>
-              <a:t>trainings</a:t>
-            </a:r>
-            <a:r>
-              <a:rPr lang="fi-FI" sz="1800" dirty="0" smtClean="0"/>
-              <a:t> and </a:t>
-            </a:r>
-            <a:r>
-              <a:rPr lang="fi-FI" sz="1800" dirty="0" err="1" smtClean="0"/>
-              <a:t>skill</a:t>
-            </a:r>
-            <a:r>
-              <a:rPr lang="fi-FI" sz="1800" dirty="0" smtClean="0"/>
-              <a:t> </a:t>
-            </a:r>
-            <a:r>
-              <a:rPr lang="fi-FI" sz="1800" dirty="0" err="1" smtClean="0"/>
-              <a:t>building</a:t>
-            </a:r>
-            <a:endParaRPr lang="fi-FI" sz="1800" dirty="0" smtClean="0"/>
-          </a:p>
-          <a:p>
-            <a:r>
-              <a:rPr lang="fi-FI" sz="1800" dirty="0" err="1" smtClean="0"/>
-              <a:t>Pair</a:t>
-            </a:r>
-            <a:r>
-              <a:rPr lang="fi-FI" sz="1800" dirty="0" smtClean="0"/>
-              <a:t> </a:t>
-            </a:r>
-            <a:r>
-              <a:rPr lang="fi-FI" sz="1800" dirty="0" err="1" smtClean="0"/>
-              <a:t>up</a:t>
-            </a:r>
-            <a:r>
-              <a:rPr lang="fi-FI" sz="1800" dirty="0" smtClean="0"/>
-              <a:t> </a:t>
-            </a:r>
-            <a:r>
-              <a:rPr lang="fi-FI" sz="1800" dirty="0" err="1" smtClean="0"/>
-              <a:t>with</a:t>
-            </a:r>
-            <a:r>
-              <a:rPr lang="fi-FI" sz="1800" dirty="0" smtClean="0"/>
-              <a:t> </a:t>
-            </a:r>
-            <a:r>
-              <a:rPr lang="fi-FI" sz="1800" dirty="0" err="1" smtClean="0"/>
-              <a:t>developers</a:t>
-            </a:r>
-            <a:r>
-              <a:rPr lang="fi-FI" sz="1800" dirty="0" smtClean="0"/>
-              <a:t> for </a:t>
-            </a:r>
-            <a:r>
-              <a:rPr lang="fi-FI" sz="1800" dirty="0" err="1" smtClean="0"/>
-              <a:t>shared</a:t>
-            </a:r>
-            <a:r>
-              <a:rPr lang="fi-FI" sz="1800" dirty="0" smtClean="0"/>
-              <a:t> </a:t>
-            </a:r>
-            <a:r>
-              <a:rPr lang="fi-FI" sz="1800" dirty="0" err="1" smtClean="0"/>
-              <a:t>experiences</a:t>
-            </a:r>
-            <a:r>
-              <a:rPr lang="fi-FI" sz="1800" dirty="0" smtClean="0"/>
-              <a:t> on </a:t>
-            </a:r>
-            <a:r>
-              <a:rPr lang="fi-FI" sz="1800" dirty="0" err="1" smtClean="0"/>
-              <a:t>quality</a:t>
-            </a:r>
-            <a:endParaRPr lang="fi-FI" sz="1800" dirty="0" smtClean="0"/>
-          </a:p>
-          <a:p>
-            <a:r>
-              <a:rPr lang="fi-FI" sz="1800" dirty="0" err="1" smtClean="0"/>
-              <a:t>Get</a:t>
-            </a:r>
-            <a:r>
-              <a:rPr lang="fi-FI" sz="1800" dirty="0" smtClean="0"/>
-              <a:t> </a:t>
-            </a:r>
-            <a:r>
-              <a:rPr lang="fi-FI" sz="1800" dirty="0" err="1" smtClean="0"/>
-              <a:t>developers</a:t>
-            </a:r>
-            <a:r>
-              <a:rPr lang="fi-FI" sz="1800" dirty="0" smtClean="0"/>
-              <a:t> to </a:t>
-            </a:r>
-            <a:r>
-              <a:rPr lang="fi-FI" sz="1800" dirty="0" err="1" smtClean="0"/>
-              <a:t>pair</a:t>
-            </a:r>
-            <a:r>
-              <a:rPr lang="fi-FI" sz="1800" dirty="0" smtClean="0"/>
-              <a:t> </a:t>
-            </a:r>
-            <a:r>
-              <a:rPr lang="fi-FI" sz="1800" dirty="0" err="1" smtClean="0"/>
-              <a:t>up</a:t>
-            </a:r>
-            <a:r>
-              <a:rPr lang="fi-FI" sz="1800" dirty="0" smtClean="0"/>
-              <a:t> </a:t>
-            </a:r>
-            <a:r>
-              <a:rPr lang="fi-FI" sz="1800" dirty="0" err="1" smtClean="0"/>
-              <a:t>with</a:t>
-            </a:r>
-            <a:r>
-              <a:rPr lang="fi-FI" sz="1800" dirty="0" smtClean="0"/>
-              <a:t> </a:t>
-            </a:r>
-            <a:r>
-              <a:rPr lang="fi-FI" sz="1800" dirty="0" err="1" smtClean="0"/>
-              <a:t>code</a:t>
-            </a:r>
-            <a:endParaRPr lang="fi-FI" sz="1800" dirty="0" smtClean="0"/>
-          </a:p>
-          <a:p>
-            <a:r>
-              <a:rPr lang="fi-FI" sz="1800" dirty="0" err="1" smtClean="0"/>
-              <a:t>Challenge</a:t>
-            </a:r>
-            <a:r>
-              <a:rPr lang="fi-FI" sz="1800" dirty="0" smtClean="0"/>
-              <a:t> </a:t>
-            </a:r>
-            <a:r>
-              <a:rPr lang="fi-FI" sz="1800" dirty="0" err="1" smtClean="0"/>
-              <a:t>requirements</a:t>
-            </a:r>
-            <a:r>
-              <a:rPr lang="fi-FI" sz="1800" dirty="0" smtClean="0"/>
-              <a:t> </a:t>
-            </a:r>
-            <a:r>
-              <a:rPr lang="fi-FI" sz="1800" dirty="0" err="1" smtClean="0"/>
-              <a:t>with</a:t>
-            </a:r>
-            <a:r>
-              <a:rPr lang="fi-FI" sz="1800" dirty="0" smtClean="0"/>
-              <a:t> </a:t>
-            </a:r>
-            <a:r>
-              <a:rPr lang="fi-FI" sz="1800" dirty="0" err="1" smtClean="0"/>
-              <a:t>product</a:t>
-            </a:r>
-            <a:r>
-              <a:rPr lang="fi-FI" sz="1800" dirty="0" smtClean="0"/>
-              <a:t> management</a:t>
-            </a:r>
-          </a:p>
-          <a:p>
-            <a:r>
-              <a:rPr lang="fi-FI" sz="1800" dirty="0" err="1" smtClean="0"/>
-              <a:t>Negotiate</a:t>
-            </a:r>
-            <a:r>
-              <a:rPr lang="fi-FI" sz="1800" dirty="0" smtClean="0"/>
-              <a:t> </a:t>
-            </a:r>
-            <a:r>
-              <a:rPr lang="fi-FI" sz="1800" dirty="0" err="1" smtClean="0"/>
-              <a:t>right</a:t>
-            </a:r>
-            <a:r>
-              <a:rPr lang="fi-FI" sz="1800" dirty="0" smtClean="0"/>
-              <a:t> </a:t>
-            </a:r>
-            <a:r>
-              <a:rPr lang="fi-FI" sz="1800" dirty="0" err="1" smtClean="0"/>
-              <a:t>skillset</a:t>
-            </a:r>
-            <a:r>
-              <a:rPr lang="fi-FI" sz="1800" dirty="0" smtClean="0"/>
-              <a:t> </a:t>
-            </a:r>
-            <a:r>
-              <a:rPr lang="fi-FI" sz="1800" dirty="0" err="1" smtClean="0"/>
-              <a:t>ratios</a:t>
-            </a:r>
-            <a:r>
-              <a:rPr lang="fi-FI" sz="1800" dirty="0" smtClean="0"/>
-              <a:t> for the </a:t>
-            </a:r>
-            <a:r>
-              <a:rPr lang="fi-FI" sz="1800" dirty="0" err="1" smtClean="0"/>
-              <a:t>team</a:t>
+              <a:t>Neuvottele oikeat osaamiset oikeassa suhteessa</a:t>
             </a:r>
             <a:endParaRPr lang="fi-FI" sz="1800" dirty="0" smtClean="0"/>
           </a:p>
@@ -8570,137 +8071,32 @@
           <a:lstStyle/>
           <a:p>
             <a:r>
-              <a:rPr lang="fi-FI" sz="1800" dirty="0" err="1" smtClean="0"/>
-              <a:t>Point</a:t>
-            </a:r>
-            <a:r>
               <a:rPr lang="fi-FI" sz="1800" dirty="0" smtClean="0"/>
-              <a:t> out </a:t>
-            </a:r>
-            <a:r>
-              <a:rPr lang="fi-FI" sz="1800" dirty="0" err="1" smtClean="0"/>
-              <a:t>things</a:t>
-            </a:r>
+              <a:t>Osoita toimimattomia kohtia</a:t>
+            </a:r>
+          </a:p>
+          <a:p>
             <a:r>
               <a:rPr lang="fi-FI" sz="1800" dirty="0" smtClean="0"/>
-              <a:t> </a:t>
-            </a:r>
-            <a:r>
-              <a:rPr lang="fi-FI" sz="1800" dirty="0" err="1" smtClean="0"/>
-              <a:t>that</a:t>
-            </a:r>
+              <a:t>Tuota näkyvyys testaustarpeisiin</a:t>
+            </a:r>
+            <a:endParaRPr lang="fi-FI" sz="1800" dirty="0" smtClean="0"/>
+          </a:p>
+          <a:p>
             <a:r>
               <a:rPr lang="fi-FI" sz="1800" dirty="0" smtClean="0"/>
-              <a:t> </a:t>
-            </a:r>
-            <a:r>
-              <a:rPr lang="fi-FI" sz="1800" dirty="0" err="1" smtClean="0"/>
-              <a:t>don’t</a:t>
-            </a:r>
+              <a:t>Korjaa kirjoitusvirheit</a:t>
+            </a:r>
+            <a:r>
+              <a:rPr lang="fi-FI" sz="1800" dirty="0"/>
+              <a:t>ä</a:t>
+            </a:r>
+            <a:endParaRPr lang="fi-FI" sz="1800" dirty="0" smtClean="0"/>
+          </a:p>
+          <a:p>
             <a:r>
               <a:rPr lang="fi-FI" sz="1800" dirty="0" smtClean="0"/>
-              <a:t> </a:t>
-            </a:r>
-            <a:r>
-              <a:rPr lang="fi-FI" sz="1800" dirty="0" err="1" smtClean="0"/>
-              <a:t>work</a:t>
-            </a:r>
-            <a:endParaRPr lang="fi-FI" sz="1800" dirty="0" smtClean="0"/>
-          </a:p>
-          <a:p>
-            <a:r>
-              <a:rPr lang="fi-FI" sz="1800" dirty="0" err="1" smtClean="0"/>
-              <a:t>Make</a:t>
-            </a:r>
-            <a:r>
-              <a:rPr lang="fi-FI" sz="1800" dirty="0" smtClean="0"/>
-              <a:t> </a:t>
-            </a:r>
-            <a:r>
-              <a:rPr lang="fi-FI" sz="1800" dirty="0" err="1" smtClean="0"/>
-              <a:t>efforts</a:t>
-            </a:r>
-            <a:r>
-              <a:rPr lang="fi-FI" sz="1800" dirty="0" smtClean="0"/>
-              <a:t> </a:t>
-            </a:r>
-            <a:r>
-              <a:rPr lang="fi-FI" sz="1800" dirty="0" err="1" smtClean="0"/>
-              <a:t>needed</a:t>
-            </a:r>
-            <a:r>
-              <a:rPr lang="fi-FI" sz="1800" dirty="0" smtClean="0"/>
-              <a:t> </a:t>
-            </a:r>
-            <a:r>
-              <a:rPr lang="fi-FI" sz="1800" dirty="0" err="1" smtClean="0"/>
-              <a:t>with</a:t>
-            </a:r>
-            <a:r>
-              <a:rPr lang="fi-FI" sz="1800" dirty="0" smtClean="0"/>
-              <a:t> </a:t>
-            </a:r>
-            <a:r>
-              <a:rPr lang="fi-FI" sz="1800" dirty="0" err="1" smtClean="0"/>
-              <a:t>skilled</a:t>
-            </a:r>
-            <a:r>
-              <a:rPr lang="fi-FI" sz="1800" dirty="0" smtClean="0"/>
-              <a:t> </a:t>
-            </a:r>
-            <a:r>
-              <a:rPr lang="fi-FI" sz="1800" dirty="0" err="1" smtClean="0"/>
-              <a:t>testing</a:t>
-            </a:r>
-            <a:r>
-              <a:rPr lang="fi-FI" sz="1800" dirty="0" smtClean="0"/>
-              <a:t> </a:t>
-            </a:r>
-            <a:r>
-              <a:rPr lang="fi-FI" sz="1800" dirty="0" err="1" smtClean="0"/>
-              <a:t>visible</a:t>
-            </a:r>
-            <a:endParaRPr lang="fi-FI" sz="1800" dirty="0" smtClean="0"/>
-          </a:p>
-          <a:p>
-            <a:r>
-              <a:rPr lang="fi-FI" sz="1800" dirty="0" err="1" smtClean="0"/>
-              <a:t>Fix</a:t>
-            </a:r>
-            <a:r>
-              <a:rPr lang="fi-FI" sz="1800" dirty="0" smtClean="0"/>
-              <a:t> </a:t>
-            </a:r>
-            <a:r>
-              <a:rPr lang="fi-FI" sz="1800" dirty="0" err="1" smtClean="0"/>
-              <a:t>typos</a:t>
-            </a:r>
-            <a:endParaRPr lang="fi-FI" sz="1800" dirty="0" smtClean="0"/>
-          </a:p>
-          <a:p>
-            <a:r>
-              <a:rPr lang="fi-FI" sz="1800" dirty="0" err="1" smtClean="0"/>
-              <a:t>Create</a:t>
-            </a:r>
-            <a:r>
-              <a:rPr lang="fi-FI" sz="1800" dirty="0" smtClean="0"/>
-              <a:t> &amp; </a:t>
-            </a:r>
-            <a:r>
-              <a:rPr lang="fi-FI" sz="1800" dirty="0" err="1" smtClean="0"/>
-              <a:t>Review</a:t>
-            </a:r>
-            <a:r>
-              <a:rPr lang="fi-FI" sz="1800" dirty="0" smtClean="0"/>
-              <a:t> </a:t>
-            </a:r>
-            <a:r>
-              <a:rPr lang="fi-FI" sz="1800" dirty="0" err="1" smtClean="0"/>
-              <a:t>unit</a:t>
-            </a:r>
-            <a:r>
-              <a:rPr lang="fi-FI" sz="1800" dirty="0" smtClean="0"/>
-              <a:t> &amp; </a:t>
+              <a:t>Luo &amp; katselmoi yksikkö &amp; </a:t>
             </a:r>
             <a:r>
               <a:rPr lang="fi-FI" sz="1800" dirty="0" err="1" smtClean="0"/>
@@ -8708,173 +8104,36 @@
             </a:r>
             <a:r>
               <a:rPr lang="fi-FI" sz="1800" dirty="0" smtClean="0"/>
-              <a:t> </a:t>
-            </a:r>
-            <a:r>
-              <a:rPr lang="fi-FI" sz="1800" dirty="0" err="1" smtClean="0"/>
-              <a:t>test</a:t>
-            </a:r>
+              <a:t> –testi-ideoita; Laajenna</a:t>
+            </a:r>
+            <a:endParaRPr lang="fi-FI" sz="1800" dirty="0" smtClean="0"/>
+          </a:p>
+          <a:p>
             <a:r>
               <a:rPr lang="fi-FI" sz="1800" dirty="0" smtClean="0"/>
-              <a:t> </a:t>
-            </a:r>
-            <a:r>
-              <a:rPr lang="fi-FI" sz="1800" dirty="0" err="1" smtClean="0"/>
-              <a:t>ideas</a:t>
-            </a:r>
+              <a:t>Anna ideoita liiketoimintamallin testaamiseksi</a:t>
+            </a:r>
+            <a:endParaRPr lang="fi-FI" sz="1800" dirty="0" smtClean="0"/>
+          </a:p>
+          <a:p>
             <a:r>
               <a:rPr lang="fi-FI" sz="1800" dirty="0" smtClean="0"/>
-              <a:t>; </a:t>
-            </a:r>
-            <a:r>
-              <a:rPr lang="fi-FI" sz="1800" dirty="0" err="1"/>
-              <a:t>E</a:t>
-            </a:r>
-            <a:r>
-              <a:rPr lang="fi-FI" sz="1800" dirty="0" err="1" smtClean="0"/>
-              <a:t>xtend</a:t>
+              <a:t>Luo käyttäjädokumentaatiota</a:t>
+            </a:r>
+          </a:p>
+          <a:p>
+            <a:r>
+              <a:rPr lang="fi-FI" sz="1800" dirty="0" smtClean="0"/>
+              <a:t>Tuo laatunäkökulmaa ohjausryhmätyöhön</a:t>
             </a:r>
             <a:endParaRPr lang="fi-FI" sz="1800" dirty="0" smtClean="0"/>
           </a:p>
           <a:p>
             <a:r>
-              <a:rPr lang="fi-FI" sz="1800" dirty="0" err="1" smtClean="0"/>
-              <a:t>Provide</a:t>
-            </a:r>
-            <a:r>
               <a:rPr lang="fi-FI" sz="1800" dirty="0" smtClean="0"/>
-              <a:t> </a:t>
-            </a:r>
-            <a:r>
-              <a:rPr lang="fi-FI" sz="1800" dirty="0" err="1" smtClean="0"/>
-              <a:t>ideas</a:t>
-            </a:r>
-            <a:r>
-              <a:rPr lang="fi-FI" sz="1800" dirty="0" smtClean="0"/>
-              <a:t> for </a:t>
-            </a:r>
-            <a:r>
-              <a:rPr lang="fi-FI" sz="1800" dirty="0" err="1" smtClean="0"/>
-              <a:t>how</a:t>
-            </a:r>
-            <a:r>
-              <a:rPr lang="fi-FI" sz="1800" dirty="0" smtClean="0"/>
-              <a:t> to </a:t>
-            </a:r>
-            <a:r>
-              <a:rPr lang="fi-FI" sz="1800" dirty="0" err="1" smtClean="0"/>
-              <a:t>test</a:t>
-            </a:r>
-            <a:r>
-              <a:rPr lang="fi-FI" sz="1800" dirty="0" smtClean="0"/>
-              <a:t> a business </a:t>
-            </a:r>
-            <a:r>
-              <a:rPr lang="fi-FI" sz="1800" dirty="0" err="1" smtClean="0"/>
-              <a:t>model</a:t>
+              <a:t>Esitä tarinoita tiimistä tiimin puolesta loppukäyttäjille</a:t>
             </a:r>
             <a:endParaRPr lang="fi-FI" sz="1800" dirty="0" smtClean="0"/>
-          </a:p>
-          <a:p>
-            <a:r>
-              <a:rPr lang="fi-FI" sz="1800" dirty="0" err="1" smtClean="0"/>
-              <a:t>Create</a:t>
-            </a:r>
-            <a:r>
-              <a:rPr lang="fi-FI" sz="1800" dirty="0" smtClean="0"/>
-              <a:t> </a:t>
-            </a:r>
-            <a:r>
-              <a:rPr lang="fi-FI" sz="1800" dirty="0" err="1" smtClean="0"/>
-              <a:t>User</a:t>
-            </a:r>
-            <a:r>
-              <a:rPr lang="fi-FI" sz="1800" dirty="0" smtClean="0"/>
-              <a:t> Help </a:t>
-            </a:r>
-            <a:r>
-              <a:rPr lang="fi-FI" sz="1800" dirty="0" err="1" smtClean="0"/>
-              <a:t>Documentation</a:t>
-            </a:r>
-            <a:endParaRPr lang="fi-FI" sz="1800" dirty="0" smtClean="0"/>
-          </a:p>
-          <a:p>
-            <a:r>
-              <a:rPr lang="fi-FI" sz="1800" dirty="0" err="1" smtClean="0"/>
-              <a:t>Provide</a:t>
-            </a:r>
-            <a:r>
-              <a:rPr lang="fi-FI" sz="1800" dirty="0" smtClean="0"/>
-              <a:t> </a:t>
-            </a:r>
-            <a:r>
-              <a:rPr lang="fi-FI" sz="1800" dirty="0" err="1" smtClean="0"/>
-              <a:t>quality</a:t>
-            </a:r>
-            <a:r>
-              <a:rPr lang="fi-FI" sz="1800" dirty="0" smtClean="0"/>
-              <a:t> </a:t>
-            </a:r>
-            <a:r>
-              <a:rPr lang="fi-FI" sz="1800" dirty="0" err="1" smtClean="0"/>
-              <a:t>perspective</a:t>
-            </a:r>
-            <a:r>
-              <a:rPr lang="fi-FI" sz="1800" dirty="0" smtClean="0"/>
-              <a:t> for </a:t>
-            </a:r>
-            <a:r>
-              <a:rPr lang="fi-FI" sz="1800" dirty="0" err="1" smtClean="0"/>
-              <a:t>steering</a:t>
-            </a:r>
-            <a:r>
-              <a:rPr lang="fi-FI" sz="1800" dirty="0" smtClean="0"/>
-              <a:t> </a:t>
-            </a:r>
-            <a:r>
-              <a:rPr lang="fi-FI" sz="1800" dirty="0" err="1" smtClean="0"/>
-              <a:t>groups</a:t>
-            </a:r>
-            <a:endParaRPr lang="fi-FI" sz="1800" dirty="0" smtClean="0"/>
-          </a:p>
-          <a:p>
-            <a:r>
-              <a:rPr lang="fi-FI" sz="1800" dirty="0" err="1" smtClean="0"/>
-              <a:t>Present</a:t>
-            </a:r>
-            <a:r>
-              <a:rPr lang="fi-FI" sz="1800" dirty="0" smtClean="0"/>
-              <a:t> for </a:t>
-            </a:r>
-            <a:r>
-              <a:rPr lang="fi-FI" sz="1800" dirty="0" err="1" smtClean="0"/>
-              <a:t>end</a:t>
-            </a:r>
-            <a:r>
-              <a:rPr lang="fi-FI" sz="1800" dirty="0" smtClean="0"/>
-              <a:t> </a:t>
-            </a:r>
-            <a:r>
-              <a:rPr lang="fi-FI" sz="1800" dirty="0" err="1" smtClean="0"/>
-              <a:t>users</a:t>
-            </a:r>
-            <a:r>
-              <a:rPr lang="fi-FI" sz="1800" dirty="0" smtClean="0"/>
-              <a:t> on </a:t>
-            </a:r>
-            <a:r>
-              <a:rPr lang="fi-FI" sz="1800" dirty="0" err="1" smtClean="0"/>
-              <a:t>behalf</a:t>
-            </a:r>
-            <a:r>
-              <a:rPr lang="fi-FI" sz="1800" dirty="0" smtClean="0"/>
-              <a:t> of the </a:t>
-            </a:r>
-            <a:r>
-              <a:rPr lang="fi-FI" sz="1800" dirty="0" err="1" smtClean="0"/>
-              <a:t>team</a:t>
-            </a:r>
-            <a:endParaRPr lang="en-US" sz="1800" dirty="0" smtClean="0"/>
           </a:p>
         </p:txBody>
       </p:sp>
@@ -8913,44 +8172,8 @@
           <a:p>
             <a:pPr algn="ctr"/>
             <a:r>
-              <a:rPr lang="fi-FI" dirty="0" err="1" smtClean="0"/>
-              <a:t>Not</a:t>
-            </a:r>
-            <a:r>
               <a:rPr lang="fi-FI" dirty="0" smtClean="0"/>
-              <a:t> a </a:t>
-            </a:r>
-            <a:r>
-              <a:rPr lang="fi-FI" dirty="0" err="1" smtClean="0"/>
-              <a:t>manager</a:t>
-            </a:r>
-            <a:r>
-              <a:rPr lang="fi-FI" dirty="0" smtClean="0"/>
-              <a:t>, </a:t>
-            </a:r>
-            <a:r>
-              <a:rPr lang="fi-FI" dirty="0" err="1" smtClean="0"/>
-              <a:t>very</a:t>
-            </a:r>
-            <a:r>
-              <a:rPr lang="fi-FI" dirty="0" smtClean="0"/>
-              <a:t> </a:t>
-            </a:r>
-            <a:r>
-              <a:rPr lang="fi-FI" dirty="0" err="1" smtClean="0"/>
-              <a:t>much</a:t>
-            </a:r>
-            <a:r>
-              <a:rPr lang="fi-FI" dirty="0" smtClean="0"/>
-              <a:t> a senior software </a:t>
-            </a:r>
-            <a:r>
-              <a:rPr lang="fi-FI" dirty="0" err="1" smtClean="0"/>
-              <a:t>specialist</a:t>
-            </a:r>
-            <a:r>
-              <a:rPr lang="fi-FI" dirty="0" smtClean="0"/>
-              <a:t>.  </a:t>
+              <a:t>Ei päällikkö vaan ennen kaikkea vanhempi asiantuntija</a:t>
             </a:r>
             <a:endParaRPr lang="en-US" dirty="0"/>
           </a:p>
@@ -9048,7 +8271,7 @@
         <p:spPr>
           <a:xfrm>
             <a:off x="834077" y="1741599"/>
-            <a:ext cx="7677260" cy="3416320"/>
+            <a:ext cx="7677260" cy="2585323"/>
           </a:xfrm>
           <a:prstGeom prst="rect">
             <a:avLst/>
@@ -9063,16 +8286,60 @@
           <a:p>
             <a:pPr algn="ctr"/>
             <a:r>
+              <a:rPr lang="en-US" sz="5400" dirty="0" err="1" smtClean="0"/>
+              <a:t>Testaajat</a:t>
+            </a:r>
+            <a:r>
               <a:rPr lang="en-US" sz="5400" dirty="0" smtClean="0"/>
-              <a:t>Testers </a:t>
-            </a:r>
-            <a:r>
-              <a:rPr lang="en-US" sz="5400" dirty="0"/>
-              <a:t>don't break your code, they break your *illusions* about your </a:t>
+              <a:t> </a:t>
+            </a:r>
+            <a:r>
+              <a:rPr lang="en-US" sz="5400" dirty="0" err="1" smtClean="0"/>
+              <a:t>eivät</a:t>
             </a:r>
             <a:r>
               <a:rPr lang="en-US" sz="5400" dirty="0" smtClean="0"/>
-              <a:t>code</a:t>
+              <a:t> </a:t>
+            </a:r>
+            <a:r>
+              <a:rPr lang="en-US" sz="5400" dirty="0" err="1" smtClean="0"/>
+              <a:t>riko</a:t>
+            </a:r>
+            <a:r>
+              <a:rPr lang="en-US" sz="5400" dirty="0" smtClean="0"/>
+              <a:t> </a:t>
+            </a:r>
+            <a:r>
+              <a:rPr lang="en-US" sz="5400" dirty="0" err="1" smtClean="0"/>
+              <a:t>koodiasi</a:t>
+            </a:r>
+            <a:r>
+              <a:rPr lang="en-US" sz="5400" dirty="0" smtClean="0"/>
+              <a:t>, </a:t>
+            </a:r>
+            <a:r>
+              <a:rPr lang="en-US" sz="5400" dirty="0" smtClean="0"/>
+              <a:t>he </a:t>
+            </a:r>
+            <a:r>
+              <a:rPr lang="en-US" sz="5400" dirty="0" err="1" smtClean="0"/>
+              <a:t>rikkovat</a:t>
+            </a:r>
+            <a:r>
+              <a:rPr lang="en-US" sz="5400" dirty="0" smtClean="0"/>
+              <a:t> *</a:t>
+            </a:r>
+            <a:r>
+              <a:rPr lang="en-US" sz="5400" dirty="0" err="1" smtClean="0"/>
+              <a:t>illuusioitasi</a:t>
+            </a:r>
+            <a:r>
+              <a:rPr lang="en-US" sz="5400" dirty="0" smtClean="0"/>
+              <a:t>* </a:t>
+            </a:r>
+            <a:r>
+              <a:rPr lang="en-US" sz="5400" dirty="0" err="1" smtClean="0"/>
+              <a:t>koodista</a:t>
             </a:r>
             <a:endParaRPr lang="en-US" sz="5400" dirty="0"/>
           </a:p>
@@ -9087,7 +8354,7 @@
         <p:spPr>
           <a:xfrm>
             <a:off x="6174153" y="4513385"/>
-            <a:ext cx="2730022" cy="369332"/>
+            <a:ext cx="2556108" cy="369332"/>
           </a:xfrm>
           <a:prstGeom prst="rect">
             <a:avLst/>
@@ -9102,7 +8369,19 @@
           <a:p>
             <a:r>
               <a:rPr lang="en-US" dirty="0" smtClean="0"/>
-              <a:t>* Adapted from James Bach</a:t>
+              <a:t>* </a:t>
+            </a:r>
+            <a:r>
+              <a:rPr lang="en-US" dirty="0" err="1" smtClean="0"/>
+              <a:t>Mukautettu</a:t>
+            </a:r>
+            <a:r>
+              <a:rPr lang="en-US" dirty="0" smtClean="0"/>
+              <a:t>: James </a:t>
+            </a:r>
+            <a:r>
+              <a:rPr lang="en-US" dirty="0" smtClean="0"/>
+              <a:t>Bach</a:t>
             </a:r>
             <a:endParaRPr lang="en-US" dirty="0"/>
           </a:p>
@@ -9156,8 +8435,48 @@
           <a:lstStyle/>
           <a:p>
             <a:r>
+              <a:rPr lang="en-US" dirty="0" err="1" smtClean="0"/>
+              <a:t>Asioilla</a:t>
+            </a:r>
+            <a:r>
               <a:rPr lang="en-US" dirty="0" smtClean="0"/>
-              <a:t>Things Can Look Different from Different Perspectives</a:t>
+              <a:t> on </a:t>
+            </a:r>
+            <a:r>
+              <a:rPr lang="en-US" dirty="0" err="1" smtClean="0"/>
+              <a:t>tapana</a:t>
+            </a:r>
+            <a:r>
+              <a:rPr lang="en-US" dirty="0" smtClean="0"/>
+              <a:t> </a:t>
+            </a:r>
+            <a:r>
+              <a:rPr lang="en-US" dirty="0" err="1" smtClean="0"/>
+              <a:t>näyttää</a:t>
+            </a:r>
+            <a:r>
+              <a:rPr lang="en-US" dirty="0" smtClean="0"/>
+              <a:t> </a:t>
+            </a:r>
+            <a:r>
+              <a:rPr lang="en-US" dirty="0" err="1" smtClean="0"/>
+              <a:t>erilaisilta</a:t>
+            </a:r>
+            <a:r>
+              <a:rPr lang="en-US" dirty="0" smtClean="0"/>
+              <a:t> </a:t>
+            </a:r>
+            <a:r>
+              <a:rPr lang="en-US" dirty="0" err="1" smtClean="0"/>
+              <a:t>eri</a:t>
+            </a:r>
+            <a:r>
+              <a:rPr lang="en-US" dirty="0" smtClean="0"/>
+              <a:t> </a:t>
+            </a:r>
+            <a:r>
+              <a:rPr lang="en-US" dirty="0" err="1" smtClean="0"/>
+              <a:t>näkökulmista</a:t>
             </a:r>
             <a:endParaRPr lang="en-US" dirty="0"/>
           </a:p>
@@ -9232,7 +8551,7 @@
       </p:grpSpPr>
       <p:sp>
         <p:nvSpPr>
-          <p:cNvPr id="1249282" name="Rectangle 2"/>
+          <p:cNvPr id="360450" name="Rectangle 2"/>
           <p:cNvSpPr>
             <a:spLocks noChangeArrowheads="1"/>
           </p:cNvSpPr>
@@ -9240,7 +8559,7 @@
         </p:nvSpPr>
         <p:spPr bwMode="auto">
           <a:xfrm>
-            <a:off x="228600" y="4999140"/>
+            <a:off x="228600" y="5029200"/>
             <a:ext cx="8686800" cy="914400"/>
           </a:xfrm>
           <a:prstGeom prst="rect">
@@ -9272,13 +8591,24 @@
           <a:bodyPr wrap="none" anchor="ctr"/>
           <a:lstStyle/>
           <a:p>
-            <a:endParaRPr lang="en-US"/>
-          </a:p>
-        </p:txBody>
-      </p:sp>
-      <p:sp>
-        <p:nvSpPr>
-          <p:cNvPr id="1249283" name="Rectangle 3"/>
+            <a:pPr fontAlgn="auto">
+              <a:spcBef>
+                <a:spcPts val="0"/>
+              </a:spcBef>
+              <a:spcAft>
+                <a:spcPts val="0"/>
+              </a:spcAft>
+              <a:defRPr/>
+            </a:pPr>
+            <a:endParaRPr lang="en-US">
+              <a:latin typeface="+mn-lt"/>
+            </a:endParaRPr>
+          </a:p>
+        </p:txBody>
+      </p:sp>
+      <p:sp>
+        <p:nvSpPr>
+          <p:cNvPr id="360451" name="Rectangle 3"/>
           <p:cNvSpPr>
             <a:spLocks noChangeArrowheads="1"/>
           </p:cNvSpPr>
@@ -9318,13 +8648,24 @@
           <a:bodyPr wrap="none" anchor="ctr"/>
           <a:lstStyle/>
           <a:p>
-            <a:endParaRPr lang="en-US"/>
-          </a:p>
-        </p:txBody>
-      </p:sp>
-      <p:sp>
-        <p:nvSpPr>
-          <p:cNvPr id="1249284" name="Rectangle 4"/>
+            <a:pPr fontAlgn="auto">
+              <a:spcBef>
+                <a:spcPts val="0"/>
+              </a:spcBef>
+              <a:spcAft>
+                <a:spcPts val="0"/>
+              </a:spcAft>
+              <a:defRPr/>
+            </a:pPr>
+            <a:endParaRPr lang="en-US">
+              <a:latin typeface="+mn-lt"/>
+            </a:endParaRPr>
+          </a:p>
+        </p:txBody>
+      </p:sp>
+      <p:sp>
+        <p:nvSpPr>
+          <p:cNvPr id="360452" name="Rectangle 4"/>
           <p:cNvSpPr>
             <a:spLocks noChangeArrowheads="1"/>
           </p:cNvSpPr>
@@ -9364,13 +8705,24 @@
           <a:bodyPr wrap="none" anchor="ctr"/>
           <a:lstStyle/>
           <a:p>
-            <a:endParaRPr lang="en-US"/>
-          </a:p>
-        </p:txBody>
-      </p:sp>
-      <p:sp>
-        <p:nvSpPr>
-          <p:cNvPr id="1249285" name="Rectangle 5"/>
+            <a:pPr fontAlgn="auto">
+              <a:spcBef>
+                <a:spcPts val="0"/>
+              </a:spcBef>
+              <a:spcAft>
+                <a:spcPts val="0"/>
+              </a:spcAft>
+              <a:defRPr/>
+            </a:pPr>
+            <a:endParaRPr lang="en-US">
+              <a:latin typeface="+mn-lt"/>
+            </a:endParaRPr>
+          </a:p>
+        </p:txBody>
+      </p:sp>
+      <p:sp>
+        <p:nvSpPr>
+          <p:cNvPr id="360453" name="Rectangle 5"/>
           <p:cNvSpPr>
             <a:spLocks noChangeArrowheads="1"/>
           </p:cNvSpPr>
@@ -9410,13 +8762,24 @@
           <a:bodyPr wrap="none" anchor="ctr"/>
           <a:lstStyle/>
           <a:p>
-            <a:endParaRPr lang="en-US"/>
-          </a:p>
-        </p:txBody>
-      </p:sp>
-      <p:sp>
-        <p:nvSpPr>
-          <p:cNvPr id="1249286" name="Rectangle 6"/>
+            <a:pPr fontAlgn="auto">
+              <a:spcBef>
+                <a:spcPts val="0"/>
+              </a:spcBef>
+              <a:spcAft>
+                <a:spcPts val="0"/>
+              </a:spcAft>
+              <a:defRPr/>
+            </a:pPr>
+            <a:endParaRPr lang="en-US">
+              <a:latin typeface="+mn-lt"/>
+            </a:endParaRPr>
+          </a:p>
+        </p:txBody>
+      </p:sp>
+      <p:sp>
+        <p:nvSpPr>
+          <p:cNvPr id="360454" name="Rectangle 6"/>
           <p:cNvSpPr>
             <a:spLocks noGrp="1" noChangeArrowheads="1"/>
           </p:cNvSpPr>
@@ -9426,8 +8789,8 @@
         </p:nvSpPr>
         <p:spPr>
           <a:xfrm>
-            <a:off x="609600" y="441325"/>
-            <a:ext cx="7391400" cy="549275"/>
+            <a:off x="609600" y="469900"/>
+            <a:ext cx="7391400" cy="520700"/>
           </a:xfrm>
         </p:spPr>
         <p:txBody>
@@ -9436,24 +8799,30 @@
           </a:bodyPr>
           <a:lstStyle/>
           <a:p>
+            <a:pPr fontAlgn="auto">
+              <a:spcAft>
+                <a:spcPts val="0"/>
+              </a:spcAft>
+              <a:defRPr/>
+            </a:pPr>
             <a:r>
               <a:rPr lang="en-US"/>
-              <a:t>Tester vs. Developer</a:t>
+              <a:t>Testaaja vs. Kehittäjä</a:t>
             </a:r>
             <a:br>
               <a:rPr lang="en-US"/>
             </a:br>
             <a:r>
-              <a:rPr lang="en-US" sz="1200"/>
-              <a:t>Source: Adapted from Bret Pettichord. 2000. Testers and Developers Think Differently</a:t>
-            </a:r>
-            <a:endParaRPr lang="en-GB" sz="1200"/>
-          </a:p>
-        </p:txBody>
-      </p:sp>
-      <p:sp>
-        <p:nvSpPr>
-          <p:cNvPr id="1249287" name="Text Box 7"/>
+              <a:rPr lang="en-US" sz="1000"/>
+              <a:t>Lähde: Mukaillen Bret Pettichord. 2000.Testers and Developers Think Differently</a:t>
+            </a:r>
+            <a:endParaRPr lang="en-GB" sz="1000"/>
+          </a:p>
+        </p:txBody>
+      </p:sp>
+      <p:sp>
+        <p:nvSpPr>
+          <p:cNvPr id="50182" name="Text Box 7"/>
           <p:cNvSpPr txBox="1">
             <a:spLocks noChangeArrowheads="1"/>
           </p:cNvSpPr>
@@ -9474,7 +8843,6 @@
             <a:headEnd/>
             <a:tailEnd/>
           </a:ln>
-          <a:effectLst/>
         </p:spPr>
         <p:txBody>
           <a:bodyPr>
@@ -9482,26 +8850,22 @@
           </a:bodyPr>
           <a:lstStyle/>
           <a:p>
-            <a:pPr algn="ctr" eaLnBrk="1" hangingPunct="1">
+            <a:pPr algn="ctr">
               <a:spcBef>
                 <a:spcPct val="50000"/>
               </a:spcBef>
             </a:pPr>
             <a:r>
-              <a:rPr lang="en-US" sz="2000" b="1">
-                <a:latin typeface="Arial" pitchFamily="34" charset="0"/>
-              </a:rPr>
-              <a:t>Tester</a:t>
-            </a:r>
-            <a:endParaRPr lang="en-GB" sz="2000" b="1">
-              <a:latin typeface="Arial" pitchFamily="34" charset="0"/>
-            </a:endParaRPr>
-          </a:p>
-        </p:txBody>
-      </p:sp>
-      <p:sp>
-        <p:nvSpPr>
-          <p:cNvPr id="1249288" name="Text Box 8"/>
+              <a:rPr lang="en-US" sz="2000" b="1"/>
+              <a:t>Testaaja</a:t>
+            </a:r>
+            <a:endParaRPr lang="en-GB" sz="2000" b="1"/>
+          </a:p>
+        </p:txBody>
+      </p:sp>
+      <p:sp>
+        <p:nvSpPr>
+          <p:cNvPr id="50183" name="Text Box 8"/>
           <p:cNvSpPr txBox="1">
             <a:spLocks noChangeArrowheads="1"/>
           </p:cNvSpPr>
@@ -9522,7 +8886,6 @@
             <a:headEnd/>
             <a:tailEnd/>
           </a:ln>
-          <a:effectLst/>
         </p:spPr>
         <p:txBody>
           <a:bodyPr>
@@ -9530,26 +8893,22 @@
           </a:bodyPr>
           <a:lstStyle/>
           <a:p>
-            <a:pPr algn="ctr" eaLnBrk="1" hangingPunct="1">
+            <a:pPr algn="ctr">
               <a:spcBef>
                 <a:spcPct val="50000"/>
               </a:spcBef>
             </a:pPr>
             <a:r>
-              <a:rPr lang="en-US" sz="2000" b="1">
-                <a:latin typeface="Arial" pitchFamily="34" charset="0"/>
-              </a:rPr>
-              <a:t>Developer</a:t>
-            </a:r>
-            <a:endParaRPr lang="en-GB" sz="2000" b="1">
-              <a:latin typeface="Arial" pitchFamily="34" charset="0"/>
-            </a:endParaRPr>
-          </a:p>
-        </p:txBody>
-      </p:sp>
-      <p:sp>
-        <p:nvSpPr>
-          <p:cNvPr id="1249289" name="AutoShape 9"/>
+              <a:rPr lang="en-US" sz="2000" b="1" dirty="0" err="1"/>
+              <a:t>Kehittäjä</a:t>
+            </a:r>
+            <a:endParaRPr lang="en-GB" sz="2000" b="1" dirty="0"/>
+          </a:p>
+        </p:txBody>
+      </p:sp>
+      <p:sp>
+        <p:nvSpPr>
+          <p:cNvPr id="50184" name="AutoShape 9"/>
           <p:cNvSpPr>
             <a:spLocks noChangeArrowheads="1"/>
           </p:cNvSpPr>
@@ -9574,28 +8933,31 @@
             <a:headEnd/>
             <a:tailEnd/>
           </a:ln>
-          <a:effectLst/>
         </p:spPr>
         <p:txBody>
           <a:bodyPr anchor="ctr"/>
           <a:lstStyle/>
           <a:p>
-            <a:pPr algn="ctr" eaLnBrk="1" hangingPunct="1"/>
-            <a:r>
-              <a:rPr lang="en-US">
-                <a:latin typeface="Arial" pitchFamily="34" charset="0"/>
-              </a:rPr>
-              <a:t>Need of Mastery</a:t>
-            </a:r>
-            <a:endParaRPr lang="en-GB">
-              <a:latin typeface="Arial" pitchFamily="34" charset="0"/>
-            </a:endParaRPr>
-          </a:p>
-        </p:txBody>
-      </p:sp>
-      <p:sp>
-        <p:nvSpPr>
-          <p:cNvPr id="1249290" name="AutoShape 10"/>
+            <a:pPr algn="ctr"/>
+            <a:r>
+              <a:rPr lang="en-US" dirty="0" err="1" smtClean="0"/>
+              <a:t>Asiantuntemuk-sen</a:t>
+            </a:r>
+            <a:r>
+              <a:rPr lang="en-US" dirty="0" smtClean="0"/>
+              <a:t> </a:t>
+            </a:r>
+            <a:r>
+              <a:rPr lang="en-US" dirty="0" err="1"/>
+              <a:t>tarve</a:t>
+            </a:r>
+            <a:endParaRPr lang="en-GB" dirty="0"/>
+          </a:p>
+        </p:txBody>
+      </p:sp>
+      <p:sp>
+        <p:nvSpPr>
+          <p:cNvPr id="50185" name="AutoShape 10"/>
           <p:cNvSpPr>
             <a:spLocks noChangeArrowheads="1"/>
           </p:cNvSpPr>
@@ -9620,28 +8982,23 @@
             <a:headEnd/>
             <a:tailEnd/>
           </a:ln>
-          <a:effectLst/>
         </p:spPr>
         <p:txBody>
           <a:bodyPr anchor="ctr"/>
           <a:lstStyle/>
           <a:p>
-            <a:pPr algn="ctr" eaLnBrk="1" hangingPunct="1"/>
-            <a:r>
-              <a:rPr lang="en-US">
-                <a:latin typeface="Arial" pitchFamily="34" charset="0"/>
-              </a:rPr>
-              <a:t>Focus of Modeling</a:t>
-            </a:r>
-            <a:endParaRPr lang="en-GB">
-              <a:latin typeface="Arial" pitchFamily="34" charset="0"/>
-            </a:endParaRPr>
-          </a:p>
-        </p:txBody>
-      </p:sp>
-      <p:sp>
-        <p:nvSpPr>
-          <p:cNvPr id="1249291" name="AutoShape 11"/>
+            <a:pPr algn="ctr"/>
+            <a:r>
+              <a:rPr lang="en-US"/>
+              <a:t>Mallinnuksessa keskittyy</a:t>
+            </a:r>
+            <a:endParaRPr lang="en-GB"/>
+          </a:p>
+        </p:txBody>
+      </p:sp>
+      <p:sp>
+        <p:nvSpPr>
+          <p:cNvPr id="50186" name="AutoShape 11"/>
           <p:cNvSpPr>
             <a:spLocks noChangeArrowheads="1"/>
           </p:cNvSpPr>
@@ -9666,28 +9023,23 @@
             <a:headEnd/>
             <a:tailEnd/>
           </a:ln>
-          <a:effectLst/>
         </p:spPr>
         <p:txBody>
           <a:bodyPr anchor="ctr"/>
           <a:lstStyle/>
           <a:p>
-            <a:pPr algn="ctr" eaLnBrk="1" hangingPunct="1"/>
-            <a:r>
-              <a:rPr lang="en-US">
-                <a:latin typeface="Arial" pitchFamily="34" charset="0"/>
-              </a:rPr>
-              <a:t>Focus of Thinking</a:t>
-            </a:r>
-            <a:endParaRPr lang="en-GB">
-              <a:latin typeface="Arial" pitchFamily="34" charset="0"/>
-            </a:endParaRPr>
-          </a:p>
-        </p:txBody>
-      </p:sp>
-      <p:sp>
-        <p:nvSpPr>
-          <p:cNvPr id="1249292" name="AutoShape 12"/>
+            <a:pPr algn="ctr"/>
+            <a:r>
+              <a:rPr lang="en-US"/>
+              <a:t>Ajatellessa keskittyy</a:t>
+            </a:r>
+            <a:endParaRPr lang="en-GB"/>
+          </a:p>
+        </p:txBody>
+      </p:sp>
+      <p:sp>
+        <p:nvSpPr>
+          <p:cNvPr id="50187" name="AutoShape 12"/>
           <p:cNvSpPr>
             <a:spLocks noChangeArrowheads="1"/>
           </p:cNvSpPr>
@@ -9695,7 +9047,7 @@
         </p:nvSpPr>
         <p:spPr bwMode="auto">
           <a:xfrm>
-            <a:off x="3505200" y="5075340"/>
+            <a:off x="3505200" y="5105400"/>
             <a:ext cx="2133600" cy="685800"/>
           </a:xfrm>
           <a:prstGeom prst="roundRect">
@@ -9712,28 +9064,23 @@
             <a:headEnd/>
             <a:tailEnd/>
           </a:ln>
-          <a:effectLst/>
         </p:spPr>
         <p:txBody>
           <a:bodyPr anchor="ctr"/>
           <a:lstStyle/>
           <a:p>
-            <a:pPr algn="ctr" eaLnBrk="1" hangingPunct="1"/>
-            <a:r>
-              <a:rPr lang="en-US">
-                <a:latin typeface="Arial" pitchFamily="34" charset="0"/>
-              </a:rPr>
-              <a:t>Tedium and Conflict</a:t>
-            </a:r>
-            <a:endParaRPr lang="en-GB">
-              <a:latin typeface="Arial" pitchFamily="34" charset="0"/>
-            </a:endParaRPr>
-          </a:p>
-        </p:txBody>
-      </p:sp>
-      <p:sp>
-        <p:nvSpPr>
-          <p:cNvPr id="1249293" name="Rectangle 13"/>
+            <a:pPr algn="ctr"/>
+            <a:r>
+              <a:rPr lang="en-US"/>
+              <a:t>Yksitoikkoisuus ja ristiriidat</a:t>
+            </a:r>
+            <a:endParaRPr lang="en-GB"/>
+          </a:p>
+        </p:txBody>
+      </p:sp>
+      <p:sp>
+        <p:nvSpPr>
+          <p:cNvPr id="50188" name="Rectangle 13"/>
           <p:cNvSpPr>
             <a:spLocks noChangeArrowheads="1"/>
           </p:cNvSpPr>
@@ -9754,7 +9101,6 @@
             <a:headEnd/>
             <a:tailEnd/>
           </a:ln>
-          <a:effectLst/>
         </p:spPr>
         <p:txBody>
           <a:bodyPr>
@@ -9773,53 +9119,37 @@
               <a:buNone/>
             </a:pPr>
             <a:r>
-              <a:rPr lang="fi-FI" sz="1400" b="1" dirty="0">
-                <a:latin typeface="Arial" pitchFamily="34" charset="0"/>
-              </a:rPr>
-              <a:t>Get up to speed quickly</a:t>
+              <a:rPr lang="fi-FI" sz="1400" dirty="0"/>
+              <a:t>Pystyy aloittamaan nopeasti</a:t>
             </a:r>
             <a:br>
-              <a:rPr lang="fi-FI" sz="1400" b="1" dirty="0">
-                <a:latin typeface="Arial" pitchFamily="34" charset="0"/>
-              </a:rPr>
+              <a:rPr lang="fi-FI" sz="1400" dirty="0"/>
             </a:br>
             <a:r>
-              <a:rPr lang="fi-FI" sz="1400" b="1" dirty="0">
-                <a:latin typeface="Arial" pitchFamily="34" charset="0"/>
-              </a:rPr>
-              <a:t>Generalist</a:t>
+              <a:rPr lang="fi-FI" sz="1400" dirty="0"/>
+              <a:t>Yleisosaaja</a:t>
             </a:r>
             <a:br>
-              <a:rPr lang="fi-FI" sz="1400" b="1" dirty="0">
-                <a:latin typeface="Arial" pitchFamily="34" charset="0"/>
-              </a:rPr>
+              <a:rPr lang="fi-FI" sz="1400" dirty="0"/>
             </a:br>
             <a:r>
-              <a:rPr lang="fi-FI" sz="1400" b="1" dirty="0">
-                <a:latin typeface="Arial" pitchFamily="34" charset="0"/>
-              </a:rPr>
-              <a:t>Domain knowledge</a:t>
+              <a:rPr lang="fi-FI" sz="1400" dirty="0"/>
+              <a:t>Sovellusaluetietämys</a:t>
             </a:r>
             <a:br>
-              <a:rPr lang="fi-FI" sz="1400" b="1" dirty="0">
-                <a:latin typeface="Arial" pitchFamily="34" charset="0"/>
-              </a:rPr>
+              <a:rPr lang="fi-FI" sz="1400" dirty="0"/>
             </a:br>
             <a:r>
-              <a:rPr lang="fi-FI" sz="1400" b="1" dirty="0">
-                <a:latin typeface="Arial" pitchFamily="34" charset="0"/>
-              </a:rPr>
-              <a:t>Ignorance is important</a:t>
-            </a:r>
-            <a:endParaRPr lang="en-GB" sz="1400" b="1" dirty="0">
-              <a:latin typeface="Arial" pitchFamily="34" charset="0"/>
-            </a:endParaRPr>
-          </a:p>
-        </p:txBody>
-      </p:sp>
-      <p:sp>
-        <p:nvSpPr>
-          <p:cNvPr id="1249294" name="Rectangle 14"/>
+              <a:rPr lang="fi-FI" sz="1400" dirty="0"/>
+              <a:t>Tietämättömyys on tärkeää</a:t>
+            </a:r>
+            <a:endParaRPr lang="en-GB" sz="1400" dirty="0"/>
+          </a:p>
+        </p:txBody>
+      </p:sp>
+      <p:sp>
+        <p:nvSpPr>
+          <p:cNvPr id="50189" name="Rectangle 14"/>
           <p:cNvSpPr>
             <a:spLocks noChangeArrowheads="1"/>
           </p:cNvSpPr>
@@ -9827,8 +9157,8 @@
         </p:nvSpPr>
         <p:spPr bwMode="auto">
           <a:xfrm>
-            <a:off x="5715000" y="1647825"/>
-            <a:ext cx="3124200" cy="954107"/>
+            <a:off x="5652120" y="1647825"/>
+            <a:ext cx="3394075" cy="954107"/>
           </a:xfrm>
           <a:prstGeom prst="rect">
             <a:avLst/>
@@ -9840,10 +9170,9 @@
             <a:headEnd/>
             <a:tailEnd/>
           </a:ln>
-          <a:effectLst/>
         </p:spPr>
         <p:txBody>
-          <a:bodyPr>
+          <a:bodyPr wrap="square">
             <a:spAutoFit/>
           </a:bodyPr>
           <a:lstStyle/>
@@ -9859,53 +9188,37 @@
               <a:buNone/>
             </a:pPr>
             <a:r>
-              <a:rPr lang="fi-FI" sz="1400" b="1">
-                <a:latin typeface="Arial" pitchFamily="34" charset="0"/>
-              </a:rPr>
-              <a:t>Thorough understanding</a:t>
+              <a:rPr lang="fi-FI" sz="1400" dirty="0"/>
+              <a:t>Perusteellinen ymmärrys</a:t>
             </a:r>
             <a:br>
-              <a:rPr lang="fi-FI" sz="1400" b="1">
-                <a:latin typeface="Arial" pitchFamily="34" charset="0"/>
-              </a:rPr>
+              <a:rPr lang="fi-FI" sz="1400" dirty="0"/>
             </a:br>
             <a:r>
-              <a:rPr lang="fi-FI" sz="1400" b="1">
-                <a:latin typeface="Arial" pitchFamily="34" charset="0"/>
-              </a:rPr>
-              <a:t>Specialist</a:t>
+              <a:rPr lang="fi-FI" sz="1400" dirty="0"/>
+              <a:t>Erikoisosaaja</a:t>
             </a:r>
             <a:br>
-              <a:rPr lang="fi-FI" sz="1400" b="1">
-                <a:latin typeface="Arial" pitchFamily="34" charset="0"/>
-              </a:rPr>
+              <a:rPr lang="fi-FI" sz="1400" dirty="0"/>
             </a:br>
             <a:r>
-              <a:rPr lang="fi-FI" sz="1400" b="1">
-                <a:latin typeface="Arial" pitchFamily="34" charset="0"/>
-              </a:rPr>
-              <a:t>Knowledge of product internals</a:t>
+              <a:rPr lang="fi-FI" sz="1400" dirty="0"/>
+              <a:t>Tietämys sisäisestä rakenteesta</a:t>
             </a:r>
             <a:br>
-              <a:rPr lang="fi-FI" sz="1400" b="1">
-                <a:latin typeface="Arial" pitchFamily="34" charset="0"/>
-              </a:rPr>
+              <a:rPr lang="fi-FI" sz="1400" dirty="0"/>
             </a:br>
             <a:r>
-              <a:rPr lang="fi-FI" sz="1400" b="1">
-                <a:latin typeface="Arial" pitchFamily="34" charset="0"/>
-              </a:rPr>
-              <a:t>Expertise is important</a:t>
-            </a:r>
-            <a:endParaRPr lang="en-GB" sz="1400" b="1">
-              <a:latin typeface="Arial" pitchFamily="34" charset="0"/>
-            </a:endParaRPr>
-          </a:p>
-        </p:txBody>
-      </p:sp>
-      <p:sp>
-        <p:nvSpPr>
-          <p:cNvPr id="1249295" name="Rectangle 15"/>
+              <a:rPr lang="fi-FI" sz="1400" dirty="0"/>
+              <a:t>Syvällinen osaaminen on tärkeää</a:t>
+            </a:r>
+            <a:endParaRPr lang="en-GB" sz="1400" dirty="0"/>
+          </a:p>
+        </p:txBody>
+      </p:sp>
+      <p:sp>
+        <p:nvSpPr>
+          <p:cNvPr id="50190" name="Rectangle 15"/>
           <p:cNvSpPr>
             <a:spLocks noChangeArrowheads="1"/>
           </p:cNvSpPr>
@@ -9913,8 +9226,8 @@
         </p:nvSpPr>
         <p:spPr bwMode="auto">
           <a:xfrm>
-            <a:off x="533400" y="2851150"/>
-            <a:ext cx="2971800" cy="738664"/>
+            <a:off x="0" y="2708275"/>
+            <a:ext cx="3505200" cy="954107"/>
           </a:xfrm>
           <a:prstGeom prst="rect">
             <a:avLst/>
@@ -9926,7 +9239,6 @@
             <a:headEnd/>
             <a:tailEnd/>
           </a:ln>
-          <a:effectLst/>
         </p:spPr>
         <p:txBody>
           <a:bodyPr>
@@ -9945,42 +9257,30 @@
               <a:buNone/>
             </a:pPr>
             <a:r>
-              <a:rPr lang="fi-FI" sz="1400" b="1">
-                <a:latin typeface="Arial" pitchFamily="34" charset="0"/>
-              </a:rPr>
-              <a:t>Model user behavior</a:t>
+              <a:rPr lang="fi-FI" sz="1400"/>
+              <a:t>Mallintaa käyttäjän toimintaa</a:t>
             </a:r>
             <a:br>
-              <a:rPr lang="fi-FI" sz="1400" b="1">
-                <a:latin typeface="Arial" pitchFamily="34" charset="0"/>
-              </a:rPr>
+              <a:rPr lang="fi-FI" sz="1400"/>
             </a:br>
             <a:r>
-              <a:rPr lang="fi-FI" sz="1400" b="1">
-                <a:latin typeface="Arial" pitchFamily="34" charset="0"/>
-              </a:rPr>
-              <a:t>Focus on what can go wrong</a:t>
+              <a:rPr lang="fi-FI" sz="1400"/>
+              <a:t>Keskittyy mahdolliseen epäonnistumiseen</a:t>
             </a:r>
             <a:br>
-              <a:rPr lang="fi-FI" sz="1400" b="1">
-                <a:latin typeface="Arial" pitchFamily="34" charset="0"/>
-              </a:rPr>
+              <a:rPr lang="fi-FI" sz="1400"/>
             </a:br>
             <a:r>
-              <a:rPr lang="fi-FI" sz="1400" b="1">
-                <a:latin typeface="Arial" pitchFamily="34" charset="0"/>
-              </a:rPr>
-              <a:t>Focus on severity of problem</a:t>
-            </a:r>
-            <a:endParaRPr lang="en-GB" sz="1400" b="1">
-              <a:latin typeface="Arial" pitchFamily="34" charset="0"/>
-            </a:endParaRPr>
-          </a:p>
-        </p:txBody>
-      </p:sp>
-      <p:sp>
-        <p:nvSpPr>
-          <p:cNvPr id="1249296" name="Rectangle 16"/>
+              <a:rPr lang="fi-FI" sz="1400"/>
+              <a:t>Keskittyy ongelman vakavuuteen</a:t>
+            </a:r>
+            <a:endParaRPr lang="en-GB" sz="1400"/>
+          </a:p>
+        </p:txBody>
+      </p:sp>
+      <p:sp>
+        <p:nvSpPr>
+          <p:cNvPr id="50191" name="Rectangle 16"/>
           <p:cNvSpPr>
             <a:spLocks noChangeArrowheads="1"/>
           </p:cNvSpPr>
@@ -9988,8 +9288,8 @@
         </p:nvSpPr>
         <p:spPr bwMode="auto">
           <a:xfrm>
-            <a:off x="5791200" y="2819400"/>
-            <a:ext cx="2743200" cy="738664"/>
+            <a:off x="5756275" y="2708275"/>
+            <a:ext cx="3352800" cy="954107"/>
           </a:xfrm>
           <a:prstGeom prst="rect">
             <a:avLst/>
@@ -10001,7 +9301,6 @@
             <a:headEnd/>
             <a:tailEnd/>
           </a:ln>
-          <a:effectLst/>
         </p:spPr>
         <p:txBody>
           <a:bodyPr>
@@ -10020,42 +9319,30 @@
               <a:buNone/>
             </a:pPr>
             <a:r>
-              <a:rPr lang="fi-FI" sz="1400" b="1">
-                <a:latin typeface="Arial" pitchFamily="34" charset="0"/>
-              </a:rPr>
-              <a:t>Model system design</a:t>
+              <a:rPr lang="fi-FI" sz="1400"/>
+              <a:t>Mallintaa järjestelmäsuunnittelua</a:t>
             </a:r>
             <a:br>
-              <a:rPr lang="fi-FI" sz="1400" b="1">
-                <a:latin typeface="Arial" pitchFamily="34" charset="0"/>
-              </a:rPr>
+              <a:rPr lang="fi-FI" sz="1400"/>
             </a:br>
             <a:r>
-              <a:rPr lang="fi-FI" sz="1400" b="1">
-                <a:latin typeface="Arial" pitchFamily="34" charset="0"/>
-              </a:rPr>
-              <a:t>Focus on how it can work</a:t>
+              <a:rPr lang="fi-FI" sz="1400"/>
+              <a:t>Keskittyy mahdolliseen toimintaan</a:t>
             </a:r>
             <a:br>
-              <a:rPr lang="fi-FI" sz="1400" b="1">
-                <a:latin typeface="Arial" pitchFamily="34" charset="0"/>
-              </a:rPr>
+              <a:rPr lang="fi-FI" sz="1400"/>
             </a:br>
             <a:r>
-              <a:rPr lang="fi-FI" sz="1400" b="1">
-                <a:latin typeface="Arial" pitchFamily="34" charset="0"/>
-              </a:rPr>
-              <a:t>Focus on interest of problem</a:t>
-            </a:r>
-            <a:endParaRPr lang="en-GB" sz="1400" b="1">
-              <a:latin typeface="Arial" pitchFamily="34" charset="0"/>
-            </a:endParaRPr>
-          </a:p>
-        </p:txBody>
-      </p:sp>
-      <p:sp>
-        <p:nvSpPr>
-          <p:cNvPr id="1249297" name="Rectangle 17"/>
+              <a:rPr lang="fi-FI" sz="1400"/>
+              <a:t>Keskittyy ongelman mielenkiintoisuuteen</a:t>
+            </a:r>
+            <a:endParaRPr lang="en-GB" sz="1400"/>
+          </a:p>
+        </p:txBody>
+      </p:sp>
+      <p:sp>
+        <p:nvSpPr>
+          <p:cNvPr id="50192" name="Rectangle 17"/>
           <p:cNvSpPr>
             <a:spLocks noChangeArrowheads="1"/>
           </p:cNvSpPr>
@@ -10076,7 +9363,6 @@
             <a:headEnd/>
             <a:tailEnd/>
           </a:ln>
-          <a:effectLst/>
         </p:spPr>
         <p:txBody>
           <a:bodyPr>
@@ -10095,42 +9381,30 @@
               <a:buNone/>
             </a:pPr>
             <a:r>
-              <a:rPr lang="fi-FI" sz="1400" b="1">
-                <a:latin typeface="Arial" pitchFamily="34" charset="0"/>
-              </a:rPr>
-              <a:t>Practical</a:t>
+              <a:rPr lang="fi-FI" sz="1400"/>
+              <a:t>Käytännöllinen</a:t>
             </a:r>
             <a:br>
-              <a:rPr lang="fi-FI" sz="1400" b="1">
-                <a:latin typeface="Arial" pitchFamily="34" charset="0"/>
-              </a:rPr>
+              <a:rPr lang="fi-FI" sz="1400"/>
             </a:br>
             <a:r>
-              <a:rPr lang="fi-FI" sz="1400" b="1">
-                <a:latin typeface="Arial" pitchFamily="34" charset="0"/>
-              </a:rPr>
-              <a:t>Empirical: What is observed</a:t>
+              <a:rPr lang="fi-FI" sz="1400"/>
+              <a:t>Empiirinen havainnointi</a:t>
             </a:r>
             <a:br>
-              <a:rPr lang="fi-FI" sz="1400" b="1">
-                <a:latin typeface="Arial" pitchFamily="34" charset="0"/>
-              </a:rPr>
+              <a:rPr lang="fi-FI" sz="1400"/>
             </a:br>
             <a:r>
-              <a:rPr lang="fi-FI" sz="1400" b="1">
-                <a:latin typeface="Arial" pitchFamily="34" charset="0"/>
-              </a:rPr>
-              <a:t>Sceptics</a:t>
-            </a:r>
-            <a:endParaRPr lang="en-GB" sz="1400" b="1">
-              <a:latin typeface="Arial" pitchFamily="34" charset="0"/>
-            </a:endParaRPr>
-          </a:p>
-        </p:txBody>
-      </p:sp>
-      <p:sp>
-        <p:nvSpPr>
-          <p:cNvPr id="1249298" name="Rectangle 18"/>
+              <a:rPr lang="fi-FI" sz="1400"/>
+              <a:t>Epäuskoinen</a:t>
+            </a:r>
+            <a:endParaRPr lang="en-GB" sz="1400"/>
+          </a:p>
+        </p:txBody>
+      </p:sp>
+      <p:sp>
+        <p:nvSpPr>
+          <p:cNvPr id="50193" name="Rectangle 18"/>
           <p:cNvSpPr>
             <a:spLocks noChangeArrowheads="1"/>
           </p:cNvSpPr>
@@ -10151,7 +9425,6 @@
             <a:headEnd/>
             <a:tailEnd/>
           </a:ln>
-          <a:effectLst/>
         </p:spPr>
         <p:txBody>
           <a:bodyPr>
@@ -10170,42 +9443,30 @@
               <a:buNone/>
             </a:pPr>
             <a:r>
-              <a:rPr lang="fi-FI" sz="1400" b="1">
-                <a:latin typeface="Arial" pitchFamily="34" charset="0"/>
-              </a:rPr>
-              <a:t>Theoretical</a:t>
+              <a:rPr lang="fi-FI" sz="1400" dirty="0"/>
+              <a:t>Teoreettinen</a:t>
             </a:r>
             <a:br>
-              <a:rPr lang="fi-FI" sz="1400" b="1">
-                <a:latin typeface="Arial" pitchFamily="34" charset="0"/>
-              </a:rPr>
+              <a:rPr lang="fi-FI" sz="1400" dirty="0"/>
             </a:br>
             <a:r>
-              <a:rPr lang="fi-FI" sz="1400" b="1">
-                <a:latin typeface="Arial" pitchFamily="34" charset="0"/>
-              </a:rPr>
-              <a:t>How it is designed</a:t>
+              <a:rPr lang="fi-FI" sz="1400" dirty="0"/>
+              <a:t>Kuinka suunniteltu toimimaan</a:t>
             </a:r>
             <a:br>
-              <a:rPr lang="fi-FI" sz="1400" b="1">
-                <a:latin typeface="Arial" pitchFamily="34" charset="0"/>
-              </a:rPr>
+              <a:rPr lang="fi-FI" sz="1400" dirty="0"/>
             </a:br>
             <a:r>
-              <a:rPr lang="fi-FI" sz="1400" b="1">
-                <a:latin typeface="Arial" pitchFamily="34" charset="0"/>
-              </a:rPr>
-              <a:t>Believers</a:t>
-            </a:r>
-            <a:endParaRPr lang="en-GB" sz="1400" b="1">
-              <a:latin typeface="Arial" pitchFamily="34" charset="0"/>
-            </a:endParaRPr>
-          </a:p>
-        </p:txBody>
-      </p:sp>
-      <p:sp>
-        <p:nvSpPr>
-          <p:cNvPr id="1249299" name="Rectangle 19"/>
+              <a:rPr lang="fi-FI" sz="1400" dirty="0"/>
+              <a:t>Halukas uskomaan</a:t>
+            </a:r>
+            <a:endParaRPr lang="en-GB" sz="1400" dirty="0"/>
+          </a:p>
+        </p:txBody>
+      </p:sp>
+      <p:sp>
+        <p:nvSpPr>
+          <p:cNvPr id="50194" name="Rectangle 19"/>
           <p:cNvSpPr>
             <a:spLocks noChangeArrowheads="1"/>
           </p:cNvSpPr>
@@ -10213,7 +9474,7 @@
         </p:nvSpPr>
         <p:spPr bwMode="auto">
           <a:xfrm>
-            <a:off x="381000" y="5107090"/>
+            <a:off x="381000" y="5137150"/>
             <a:ext cx="2819400" cy="738664"/>
           </a:xfrm>
           <a:prstGeom prst="rect">
@@ -10226,7 +9487,6 @@
             <a:headEnd/>
             <a:tailEnd/>
           </a:ln>
-          <a:effectLst/>
         </p:spPr>
         <p:txBody>
           <a:bodyPr>
@@ -10245,39 +9505,29 @@
               <a:buNone/>
             </a:pPr>
             <a:r>
-              <a:rPr lang="fi-FI" sz="1400" b="1">
-                <a:latin typeface="Arial" pitchFamily="34" charset="0"/>
-              </a:rPr>
-              <a:t>Tolerate tedium</a:t>
+              <a:rPr lang="fi-FI" sz="1400"/>
+              <a:t>Sietää yksitoikkoisuutta</a:t>
             </a:r>
             <a:br>
-              <a:rPr lang="fi-FI" sz="1400" b="1">
-                <a:latin typeface="Arial" pitchFamily="34" charset="0"/>
-              </a:rPr>
+              <a:rPr lang="fi-FI" sz="1400"/>
             </a:br>
             <a:r>
-              <a:rPr lang="fi-FI" sz="1400" b="1">
-                <a:latin typeface="Arial" pitchFamily="34" charset="0"/>
-              </a:rPr>
-              <a:t>Comfortable with conflict</a:t>
+              <a:rPr lang="fi-FI" sz="1400"/>
+              <a:t>Sopeutuu ristiriitatilanteissa</a:t>
             </a:r>
             <a:br>
-              <a:rPr lang="fi-FI" sz="1400" b="1">
-                <a:latin typeface="Arial" pitchFamily="34" charset="0"/>
-              </a:rPr>
+              <a:rPr lang="fi-FI" sz="1400"/>
             </a:br>
             <a:r>
-              <a:rPr lang="fi-FI" sz="1400" b="1">
-                <a:latin typeface="Arial" pitchFamily="34" charset="0"/>
-              </a:rPr>
-              <a:t>Report problems</a:t>
-            </a:r>
-          </a:p>
-        </p:txBody>
-      </p:sp>
-      <p:sp>
-        <p:nvSpPr>
-          <p:cNvPr id="1249300" name="Rectangle 20"/>
+              <a:rPr lang="fi-FI" sz="1400"/>
+              <a:t>Raportoi ongelmia</a:t>
+            </a:r>
+          </a:p>
+        </p:txBody>
+      </p:sp>
+      <p:sp>
+        <p:nvSpPr>
+          <p:cNvPr id="50195" name="Rectangle 20"/>
           <p:cNvSpPr>
             <a:spLocks noChangeArrowheads="1"/>
           </p:cNvSpPr>
@@ -10285,8 +9535,8 @@
         </p:nvSpPr>
         <p:spPr bwMode="auto">
           <a:xfrm>
-            <a:off x="5791200" y="5107090"/>
-            <a:ext cx="2743200" cy="738664"/>
+            <a:off x="5791200" y="4995173"/>
+            <a:ext cx="2743200" cy="954107"/>
           </a:xfrm>
           <a:prstGeom prst="rect">
             <a:avLst/>
@@ -10298,7 +9548,6 @@
             <a:headEnd/>
             <a:tailEnd/>
           </a:ln>
-          <a:effectLst/>
         </p:spPr>
         <p:txBody>
           <a:bodyPr>
@@ -10317,36 +9566,24 @@
               <a:buNone/>
             </a:pPr>
             <a:r>
-              <a:rPr lang="fi-FI" sz="1400" b="1">
-                <a:latin typeface="Arial" pitchFamily="34" charset="0"/>
-              </a:rPr>
-              <a:t>Automate tedium</a:t>
+              <a:rPr lang="fi-FI" sz="1400" dirty="0"/>
+              <a:t>Automatisoi yksitoikkoisuutta</a:t>
             </a:r>
             <a:br>
-              <a:rPr lang="fi-FI" sz="1400" b="1">
-                <a:latin typeface="Arial" pitchFamily="34" charset="0"/>
-              </a:rPr>
+              <a:rPr lang="fi-FI" sz="1400" dirty="0"/>
             </a:br>
             <a:r>
-              <a:rPr lang="fi-FI" sz="1400" b="1">
-                <a:latin typeface="Arial" pitchFamily="34" charset="0"/>
-              </a:rPr>
-              <a:t>Avoid conflict</a:t>
+              <a:rPr lang="fi-FI" sz="1400" dirty="0"/>
+              <a:t>Välttää ristiriitatilanteita</a:t>
             </a:r>
             <a:br>
-              <a:rPr lang="fi-FI" sz="1400" b="1">
-                <a:latin typeface="Arial" pitchFamily="34" charset="0"/>
-              </a:rPr>
+              <a:rPr lang="fi-FI" sz="1400" dirty="0"/>
             </a:br>
             <a:r>
-              <a:rPr lang="fi-FI" sz="1400" b="1">
-                <a:latin typeface="Arial" pitchFamily="34" charset="0"/>
-              </a:rPr>
-              <a:t>Understand problems</a:t>
-            </a:r>
-            <a:endParaRPr lang="en-GB" sz="1400" b="1">
-              <a:latin typeface="Arial" pitchFamily="34" charset="0"/>
-            </a:endParaRPr>
+              <a:rPr lang="fi-FI" sz="1400" dirty="0"/>
+              <a:t>Ymmärtää ongelmia</a:t>
+            </a:r>
+            <a:endParaRPr lang="en-GB" sz="1400" dirty="0"/>
           </a:p>
         </p:txBody>
       </p:sp>
@@ -10365,31 +9602,36 @@
           <a:bodyPr/>
           <a:lstStyle/>
           <a:p>
-            <a:fld id="{B6F15528-21DE-4FAA-801E-634DDDAF4B2B}" type="slidenum">
-              <a:rPr lang="en-US" smtClean="0"/>
-              <a:pPr/>
+            <a:pPr>
+              <a:defRPr/>
+            </a:pPr>
+            <a:fld id="{C4EE03DE-D135-4520-BB83-4291CABA1041}" type="slidenum">
+              <a:rPr lang="sv-SE"/>
+              <a:pPr>
+                <a:defRPr/>
+              </a:pPr>
               <a:t>9</a:t>
             </a:fld>
-            <a:endParaRPr lang="en-US"/>
+            <a:endParaRPr lang="sv-SE"/>
           </a:p>
         </p:txBody>
       </p:sp>
     </p:spTree>
     <p:extLst>
       <p:ext uri="{BB962C8B-B14F-4D97-AF65-F5344CB8AC3E}">
-        <p14:creationId xmlns:p14="http://schemas.microsoft.com/office/powerpoint/2010/main" val="2424236694"/>
+        <p14:creationId xmlns:p14="http://schemas.microsoft.com/office/powerpoint/2010/main" val="2094309081"/>
       </p:ext>
     </p:extLst>
   </p:cSld>
   <p:clrMapOvr>
     <a:masterClrMapping/>
   </p:clrMapOvr>
-  <mc:AlternateContent xmlns:mc="http://schemas.openxmlformats.org/markup-compatibility/2006" xmlns:p14="http://schemas.microsoft.com/office/powerpoint/2010/main">
-    <mc:Choice Requires="p14">
+  <mc:AlternateContent xmlns:mc="http://schemas.openxmlformats.org/markup-compatibility/2006">
+    <mc:Choice xmlns:p14="http://schemas.microsoft.com/office/powerpoint/2010/main" Requires="p14">
       <p:transition spd="slow" p14:dur="2000"/>
     </mc:Choice>
-    <mc:Fallback xmlns="">
-      <p:transition spd="slow"/>
+    <mc:Fallback>
+      <p:transition xmlns:p14="http://schemas.microsoft.com/office/powerpoint/2010/main" spd="slow"/>
     </mc:Fallback>
   </mc:AlternateContent>
   <p:timing>

</xml_diff>